<commit_message>
Okkkaaay, maintenant les mouton voient jusqu'a 5 case, On balance les callback dans le bon ordre au debut maj du ppt en consequence
</commit_message>
<xml_diff>
--- a/Pattern Matcher.pptx
+++ b/Pattern Matcher.pptx
@@ -5806,7 +5806,7 @@
           <a:p>
             <a:fld id="{565C5295-D0C3-4D5C-872A-84B3C3C626EE}" type="datetimeFigureOut">
               <a:rPr lang="en-US" smtClean="0"/>
-              <a:t>1/4/2012</a:t>
+              <a:t>1/5/2012</a:t>
             </a:fld>
             <a:endParaRPr lang="en-US" dirty="0"/>
           </a:p>
@@ -6091,7 +6091,7 @@
           <a:p>
             <a:fld id="{565C5295-D0C3-4D5C-872A-84B3C3C626EE}" type="datetimeFigureOut">
               <a:rPr lang="en-US" smtClean="0"/>
-              <a:t>1/4/2012</a:t>
+              <a:t>1/5/2012</a:t>
             </a:fld>
             <a:endParaRPr lang="en-US" dirty="0"/>
           </a:p>
@@ -6266,7 +6266,7 @@
           <a:p>
             <a:fld id="{565C5295-D0C3-4D5C-872A-84B3C3C626EE}" type="datetimeFigureOut">
               <a:rPr lang="en-US" smtClean="0"/>
-              <a:t>1/4/2012</a:t>
+              <a:t>1/5/2012</a:t>
             </a:fld>
             <a:endParaRPr lang="en-US" dirty="0"/>
           </a:p>
@@ -6431,7 +6431,7 @@
           <a:p>
             <a:fld id="{565C5295-D0C3-4D5C-872A-84B3C3C626EE}" type="datetimeFigureOut">
               <a:rPr lang="en-US" smtClean="0"/>
-              <a:t>1/4/2012</a:t>
+              <a:t>1/5/2012</a:t>
             </a:fld>
             <a:endParaRPr lang="en-US" dirty="0"/>
           </a:p>
@@ -6672,7 +6672,7 @@
           <a:p>
             <a:fld id="{565C5295-D0C3-4D5C-872A-84B3C3C626EE}" type="datetimeFigureOut">
               <a:rPr lang="en-US" smtClean="0"/>
-              <a:t>1/4/2012</a:t>
+              <a:t>1/5/2012</a:t>
             </a:fld>
             <a:endParaRPr lang="en-US" dirty="0"/>
           </a:p>
@@ -6785,7 +6785,7 @@
           <a:p>
             <a:fld id="{565C5295-D0C3-4D5C-872A-84B3C3C626EE}" type="datetimeFigureOut">
               <a:rPr lang="en-US" smtClean="0"/>
-              <a:t>1/4/2012</a:t>
+              <a:t>1/5/2012</a:t>
             </a:fld>
             <a:endParaRPr lang="en-US" dirty="0"/>
           </a:p>
@@ -7324,7 +7324,7 @@
           <a:p>
             <a:fld id="{565C5295-D0C3-4D5C-872A-84B3C3C626EE}" type="datetimeFigureOut">
               <a:rPr lang="en-US" smtClean="0"/>
-              <a:t>1/4/2012</a:t>
+              <a:t>1/5/2012</a:t>
             </a:fld>
             <a:endParaRPr lang="en-US" dirty="0"/>
           </a:p>
@@ -7437,7 +7437,7 @@
           <a:p>
             <a:fld id="{565C5295-D0C3-4D5C-872A-84B3C3C626EE}" type="datetimeFigureOut">
               <a:rPr lang="en-US" smtClean="0"/>
-              <a:t>1/4/2012</a:t>
+              <a:t>1/5/2012</a:t>
             </a:fld>
             <a:endParaRPr lang="en-US" dirty="0"/>
           </a:p>
@@ -7527,7 +7527,7 @@
           <a:p>
             <a:fld id="{565C5295-D0C3-4D5C-872A-84B3C3C626EE}" type="datetimeFigureOut">
               <a:rPr lang="en-US" smtClean="0"/>
-              <a:t>1/4/2012</a:t>
+              <a:t>1/5/2012</a:t>
             </a:fld>
             <a:endParaRPr lang="en-US" dirty="0"/>
           </a:p>
@@ -10178,7 +10178,7 @@
           <a:p>
             <a:fld id="{565C5295-D0C3-4D5C-872A-84B3C3C626EE}" type="datetimeFigureOut">
               <a:rPr lang="en-US" smtClean="0"/>
-              <a:t>1/4/2012</a:t>
+              <a:t>1/5/2012</a:t>
             </a:fld>
             <a:endParaRPr lang="en-US" dirty="0"/>
           </a:p>
@@ -13390,7 +13390,7 @@
           <a:p>
             <a:fld id="{565C5295-D0C3-4D5C-872A-84B3C3C626EE}" type="datetimeFigureOut">
               <a:rPr lang="en-US" smtClean="0"/>
-              <a:t>1/4/2012</a:t>
+              <a:t>1/5/2012</a:t>
             </a:fld>
             <a:endParaRPr lang="en-US" dirty="0"/>
           </a:p>
@@ -16212,7 +16212,7 @@
           <a:p>
             <a:fld id="{565C5295-D0C3-4D5C-872A-84B3C3C626EE}" type="datetimeFigureOut">
               <a:rPr lang="en-US" smtClean="0"/>
-              <a:t>1/4/2012</a:t>
+              <a:t>1/5/2012</a:t>
             </a:fld>
             <a:endParaRPr lang="en-US" dirty="0"/>
           </a:p>
@@ -17303,19 +17303,40 @@
           <a:p>
             <a:r>
               <a:rPr lang="fr-FR" dirty="0" smtClean="0"/>
-              <a:t>41 neurones en entrée (les case vue et la faim)</a:t>
+              <a:t>74 </a:t>
+            </a:r>
+            <a:r>
+              <a:rPr lang="fr-FR" dirty="0" smtClean="0"/>
+              <a:t>neurones en entrée (les case </a:t>
+            </a:r>
+            <a:r>
+              <a:rPr lang="fr-FR" dirty="0" smtClean="0"/>
+              <a:t>vue, la faim, et </a:t>
+            </a:r>
+            <a:r>
+              <a:rPr lang="fr-FR" smtClean="0"/>
+              <a:t>la précédente sortie)</a:t>
+            </a:r>
+            <a:endParaRPr lang="fr-FR" dirty="0" smtClean="0"/>
+          </a:p>
+          <a:p>
+            <a:r>
+              <a:rPr lang="fr-FR" dirty="0"/>
+              <a:t>74 neurones </a:t>
+            </a:r>
+            <a:r>
+              <a:rPr lang="fr-FR" dirty="0" smtClean="0"/>
+              <a:t>pour la première couche caché</a:t>
             </a:r>
           </a:p>
           <a:p>
             <a:r>
               <a:rPr lang="fr-FR" dirty="0" smtClean="0"/>
-              <a:t>41 neurones pour la première couche caché</a:t>
+              <a:t>36 neurones </a:t>
             </a:r>
-          </a:p>
-          <a:p>
             <a:r>
               <a:rPr lang="fr-FR" dirty="0" smtClean="0"/>
-              <a:t>20 neurones pour la deuxième.</a:t>
+              <a:t>pour la deuxième.</a:t>
             </a:r>
           </a:p>
           <a:p>

</xml_diff>

<commit_message>
Tentative d'optim du reseau
</commit_message>
<xml_diff>
--- a/Pattern Matcher.pptx
+++ b/Pattern Matcher.pptx
@@ -17303,26 +17303,13 @@
           <a:p>
             <a:r>
               <a:rPr lang="fr-FR" dirty="0" smtClean="0"/>
-              <a:t>74 </a:t>
+              <a:t>74 neurones en entrée (les case vue, la faim, et la précédente sortie)</a:t>
             </a:r>
-            <a:r>
-              <a:rPr lang="fr-FR" dirty="0" smtClean="0"/>
-              <a:t>neurones en entrée (les case </a:t>
-            </a:r>
-            <a:r>
-              <a:rPr lang="fr-FR" dirty="0" smtClean="0"/>
-              <a:t>vue, la faim, et </a:t>
-            </a:r>
-            <a:r>
-              <a:rPr lang="fr-FR" smtClean="0"/>
-              <a:t>la précédente sortie)</a:t>
-            </a:r>
-            <a:endParaRPr lang="fr-FR" dirty="0" smtClean="0"/>
           </a:p>
           <a:p>
             <a:r>
-              <a:rPr lang="fr-FR" dirty="0"/>
-              <a:t>74 neurones </a:t>
+              <a:rPr lang="fr-FR" smtClean="0"/>
+              <a:t>50 neurones </a:t>
             </a:r>
             <a:r>
               <a:rPr lang="fr-FR" dirty="0" smtClean="0"/>
@@ -17332,11 +17319,7 @@
           <a:p>
             <a:r>
               <a:rPr lang="fr-FR" dirty="0" smtClean="0"/>
-              <a:t>36 neurones </a:t>
-            </a:r>
-            <a:r>
-              <a:rPr lang="fr-FR" dirty="0" smtClean="0"/>
-              <a:t>pour la deuxième.</a:t>
+              <a:t>36 neurones pour la deuxième.</a:t>
             </a:r>
           </a:p>
           <a:p>

</xml_diff>

<commit_message>
augmentation du spawn de l'herbe
</commit_message>
<xml_diff>
--- a/Pattern Matcher.pptx
+++ b/Pattern Matcher.pptx
@@ -4,6 +4,9 @@
   <p:sldMasterIdLst>
     <p:sldMasterId id="2147483696" r:id="rId1"/>
   </p:sldMasterIdLst>
+  <p:notesMasterIdLst>
+    <p:notesMasterId r:id="rId10"/>
+  </p:notesMasterIdLst>
   <p:sldIdLst>
     <p:sldId id="256" r:id="rId2"/>
     <p:sldId id="257" r:id="rId3"/>
@@ -3049,6 +3052,356 @@
 </dgm:styleDef>
 </file>
 
+<file path=ppt/notesMasters/notesMaster1.xml><?xml version="1.0" encoding="utf-8"?>
+<p:notesMaster xmlns:a="http://schemas.openxmlformats.org/drawingml/2006/main" xmlns:r="http://schemas.openxmlformats.org/officeDocument/2006/relationships" xmlns:p="http://schemas.openxmlformats.org/presentationml/2006/main">
+  <p:cSld>
+    <p:bg>
+      <p:bgRef idx="1001">
+        <a:schemeClr val="bg1"/>
+      </p:bgRef>
+    </p:bg>
+    <p:spTree>
+      <p:nvGrpSpPr>
+        <p:cNvPr id="1" name=""/>
+        <p:cNvGrpSpPr/>
+        <p:nvPr/>
+      </p:nvGrpSpPr>
+      <p:grpSpPr>
+        <a:xfrm>
+          <a:off x="0" y="0"/>
+          <a:ext cx="0" cy="0"/>
+          <a:chOff x="0" y="0"/>
+          <a:chExt cx="0" cy="0"/>
+        </a:xfrm>
+      </p:grpSpPr>
+      <p:sp>
+        <p:nvSpPr>
+          <p:cNvPr id="2" name="Header Placeholder 1"/>
+          <p:cNvSpPr>
+            <a:spLocks noGrp="1"/>
+          </p:cNvSpPr>
+          <p:nvPr>
+            <p:ph type="hdr" sz="quarter"/>
+          </p:nvPr>
+        </p:nvSpPr>
+        <p:spPr>
+          <a:xfrm>
+            <a:off x="0" y="0"/>
+            <a:ext cx="2971800" cy="457200"/>
+          </a:xfrm>
+          <a:prstGeom prst="rect">
+            <a:avLst/>
+          </a:prstGeom>
+        </p:spPr>
+        <p:txBody>
+          <a:bodyPr vert="horz" lIns="91440" tIns="45720" rIns="91440" bIns="45720" rtlCol="0"/>
+          <a:lstStyle>
+            <a:lvl1pPr algn="l">
+              <a:defRPr sz="1200"/>
+            </a:lvl1pPr>
+          </a:lstStyle>
+          <a:p>
+            <a:endParaRPr lang="fr-FR"/>
+          </a:p>
+        </p:txBody>
+      </p:sp>
+      <p:sp>
+        <p:nvSpPr>
+          <p:cNvPr id="3" name="Date Placeholder 2"/>
+          <p:cNvSpPr>
+            <a:spLocks noGrp="1"/>
+          </p:cNvSpPr>
+          <p:nvPr>
+            <p:ph type="dt" idx="1"/>
+          </p:nvPr>
+        </p:nvSpPr>
+        <p:spPr>
+          <a:xfrm>
+            <a:off x="3884613" y="0"/>
+            <a:ext cx="2971800" cy="457200"/>
+          </a:xfrm>
+          <a:prstGeom prst="rect">
+            <a:avLst/>
+          </a:prstGeom>
+        </p:spPr>
+        <p:txBody>
+          <a:bodyPr vert="horz" lIns="91440" tIns="45720" rIns="91440" bIns="45720" rtlCol="0"/>
+          <a:lstStyle>
+            <a:lvl1pPr algn="r">
+              <a:defRPr sz="1200"/>
+            </a:lvl1pPr>
+          </a:lstStyle>
+          <a:p>
+            <a:fld id="{2A6D63A3-1AD1-4FBF-8B0E-5B941719642B}" type="datetimeFigureOut">
+              <a:rPr lang="fr-FR" smtClean="0"/>
+              <a:t>05/01/2012</a:t>
+            </a:fld>
+            <a:endParaRPr lang="fr-FR"/>
+          </a:p>
+        </p:txBody>
+      </p:sp>
+      <p:sp>
+        <p:nvSpPr>
+          <p:cNvPr id="4" name="Slide Image Placeholder 3"/>
+          <p:cNvSpPr>
+            <a:spLocks noGrp="1" noRot="1" noChangeAspect="1"/>
+          </p:cNvSpPr>
+          <p:nvPr>
+            <p:ph type="sldImg" idx="2"/>
+          </p:nvPr>
+        </p:nvSpPr>
+        <p:spPr>
+          <a:xfrm>
+            <a:off x="1143000" y="685800"/>
+            <a:ext cx="4572000" cy="3429000"/>
+          </a:xfrm>
+          <a:prstGeom prst="rect">
+            <a:avLst/>
+          </a:prstGeom>
+          <a:noFill/>
+          <a:ln w="12700">
+            <a:solidFill>
+              <a:prstClr val="black"/>
+            </a:solidFill>
+          </a:ln>
+        </p:spPr>
+        <p:txBody>
+          <a:bodyPr vert="horz" lIns="91440" tIns="45720" rIns="91440" bIns="45720" rtlCol="0" anchor="ctr"/>
+          <a:lstStyle/>
+          <a:p>
+            <a:endParaRPr lang="fr-FR"/>
+          </a:p>
+        </p:txBody>
+      </p:sp>
+      <p:sp>
+        <p:nvSpPr>
+          <p:cNvPr id="5" name="Notes Placeholder 4"/>
+          <p:cNvSpPr>
+            <a:spLocks noGrp="1"/>
+          </p:cNvSpPr>
+          <p:nvPr>
+            <p:ph type="body" sz="quarter" idx="3"/>
+          </p:nvPr>
+        </p:nvSpPr>
+        <p:spPr>
+          <a:xfrm>
+            <a:off x="685800" y="4343400"/>
+            <a:ext cx="5486400" cy="4114800"/>
+          </a:xfrm>
+          <a:prstGeom prst="rect">
+            <a:avLst/>
+          </a:prstGeom>
+        </p:spPr>
+        <p:txBody>
+          <a:bodyPr vert="horz" lIns="91440" tIns="45720" rIns="91440" bIns="45720" rtlCol="0"/>
+          <a:lstStyle/>
+          <a:p>
+            <a:pPr lvl="0"/>
+            <a:r>
+              <a:rPr lang="en-US" smtClean="0"/>
+              <a:t>Click to edit Master text styles</a:t>
+            </a:r>
+          </a:p>
+          <a:p>
+            <a:pPr lvl="1"/>
+            <a:r>
+              <a:rPr lang="en-US" smtClean="0"/>
+              <a:t>Second level</a:t>
+            </a:r>
+          </a:p>
+          <a:p>
+            <a:pPr lvl="2"/>
+            <a:r>
+              <a:rPr lang="en-US" smtClean="0"/>
+              <a:t>Third level</a:t>
+            </a:r>
+          </a:p>
+          <a:p>
+            <a:pPr lvl="3"/>
+            <a:r>
+              <a:rPr lang="en-US" smtClean="0"/>
+              <a:t>Fourth level</a:t>
+            </a:r>
+          </a:p>
+          <a:p>
+            <a:pPr lvl="4"/>
+            <a:r>
+              <a:rPr lang="en-US" smtClean="0"/>
+              <a:t>Fifth level</a:t>
+            </a:r>
+            <a:endParaRPr lang="fr-FR"/>
+          </a:p>
+        </p:txBody>
+      </p:sp>
+      <p:sp>
+        <p:nvSpPr>
+          <p:cNvPr id="6" name="Footer Placeholder 5"/>
+          <p:cNvSpPr>
+            <a:spLocks noGrp="1"/>
+          </p:cNvSpPr>
+          <p:nvPr>
+            <p:ph type="ftr" sz="quarter" idx="4"/>
+          </p:nvPr>
+        </p:nvSpPr>
+        <p:spPr>
+          <a:xfrm>
+            <a:off x="0" y="8685213"/>
+            <a:ext cx="2971800" cy="457200"/>
+          </a:xfrm>
+          <a:prstGeom prst="rect">
+            <a:avLst/>
+          </a:prstGeom>
+        </p:spPr>
+        <p:txBody>
+          <a:bodyPr vert="horz" lIns="91440" tIns="45720" rIns="91440" bIns="45720" rtlCol="0" anchor="b"/>
+          <a:lstStyle>
+            <a:lvl1pPr algn="l">
+              <a:defRPr sz="1200"/>
+            </a:lvl1pPr>
+          </a:lstStyle>
+          <a:p>
+            <a:endParaRPr lang="fr-FR"/>
+          </a:p>
+        </p:txBody>
+      </p:sp>
+      <p:sp>
+        <p:nvSpPr>
+          <p:cNvPr id="7" name="Slide Number Placeholder 6"/>
+          <p:cNvSpPr>
+            <a:spLocks noGrp="1"/>
+          </p:cNvSpPr>
+          <p:nvPr>
+            <p:ph type="sldNum" sz="quarter" idx="5"/>
+          </p:nvPr>
+        </p:nvSpPr>
+        <p:spPr>
+          <a:xfrm>
+            <a:off x="3884613" y="8685213"/>
+            <a:ext cx="2971800" cy="457200"/>
+          </a:xfrm>
+          <a:prstGeom prst="rect">
+            <a:avLst/>
+          </a:prstGeom>
+        </p:spPr>
+        <p:txBody>
+          <a:bodyPr vert="horz" lIns="91440" tIns="45720" rIns="91440" bIns="45720" rtlCol="0" anchor="b"/>
+          <a:lstStyle>
+            <a:lvl1pPr algn="r">
+              <a:defRPr sz="1200"/>
+            </a:lvl1pPr>
+          </a:lstStyle>
+          <a:p>
+            <a:fld id="{B3D06680-77FA-4349-88C6-8AF57BE0CEBD}" type="slidenum">
+              <a:rPr lang="fr-FR" smtClean="0"/>
+              <a:t>‹#›</a:t>
+            </a:fld>
+            <a:endParaRPr lang="fr-FR"/>
+          </a:p>
+        </p:txBody>
+      </p:sp>
+    </p:spTree>
+    <p:extLst>
+      <p:ext uri="{BB962C8B-B14F-4D97-AF65-F5344CB8AC3E}">
+        <p14:creationId xmlns:p14="http://schemas.microsoft.com/office/powerpoint/2010/main" val="2775039533"/>
+      </p:ext>
+    </p:extLst>
+  </p:cSld>
+  <p:clrMap bg1="lt1" tx1="dk1" bg2="lt2" tx2="dk2" accent1="accent1" accent2="accent2" accent3="accent3" accent4="accent4" accent5="accent5" accent6="accent6" hlink="hlink" folHlink="folHlink"/>
+  <p:notesStyle>
+    <a:lvl1pPr marL="0" algn="l" defTabSz="914400" rtl="0" eaLnBrk="1" latinLnBrk="0" hangingPunct="1">
+      <a:defRPr sz="1200" kern="1200">
+        <a:solidFill>
+          <a:schemeClr val="tx1"/>
+        </a:solidFill>
+        <a:latin typeface="+mn-lt"/>
+        <a:ea typeface="+mn-ea"/>
+        <a:cs typeface="+mn-cs"/>
+      </a:defRPr>
+    </a:lvl1pPr>
+    <a:lvl2pPr marL="457200" algn="l" defTabSz="914400" rtl="0" eaLnBrk="1" latinLnBrk="0" hangingPunct="1">
+      <a:defRPr sz="1200" kern="1200">
+        <a:solidFill>
+          <a:schemeClr val="tx1"/>
+        </a:solidFill>
+        <a:latin typeface="+mn-lt"/>
+        <a:ea typeface="+mn-ea"/>
+        <a:cs typeface="+mn-cs"/>
+      </a:defRPr>
+    </a:lvl2pPr>
+    <a:lvl3pPr marL="914400" algn="l" defTabSz="914400" rtl="0" eaLnBrk="1" latinLnBrk="0" hangingPunct="1">
+      <a:defRPr sz="1200" kern="1200">
+        <a:solidFill>
+          <a:schemeClr val="tx1"/>
+        </a:solidFill>
+        <a:latin typeface="+mn-lt"/>
+        <a:ea typeface="+mn-ea"/>
+        <a:cs typeface="+mn-cs"/>
+      </a:defRPr>
+    </a:lvl3pPr>
+    <a:lvl4pPr marL="1371600" algn="l" defTabSz="914400" rtl="0" eaLnBrk="1" latinLnBrk="0" hangingPunct="1">
+      <a:defRPr sz="1200" kern="1200">
+        <a:solidFill>
+          <a:schemeClr val="tx1"/>
+        </a:solidFill>
+        <a:latin typeface="+mn-lt"/>
+        <a:ea typeface="+mn-ea"/>
+        <a:cs typeface="+mn-cs"/>
+      </a:defRPr>
+    </a:lvl4pPr>
+    <a:lvl5pPr marL="1828800" algn="l" defTabSz="914400" rtl="0" eaLnBrk="1" latinLnBrk="0" hangingPunct="1">
+      <a:defRPr sz="1200" kern="1200">
+        <a:solidFill>
+          <a:schemeClr val="tx1"/>
+        </a:solidFill>
+        <a:latin typeface="+mn-lt"/>
+        <a:ea typeface="+mn-ea"/>
+        <a:cs typeface="+mn-cs"/>
+      </a:defRPr>
+    </a:lvl5pPr>
+    <a:lvl6pPr marL="2286000" algn="l" defTabSz="914400" rtl="0" eaLnBrk="1" latinLnBrk="0" hangingPunct="1">
+      <a:defRPr sz="1200" kern="1200">
+        <a:solidFill>
+          <a:schemeClr val="tx1"/>
+        </a:solidFill>
+        <a:latin typeface="+mn-lt"/>
+        <a:ea typeface="+mn-ea"/>
+        <a:cs typeface="+mn-cs"/>
+      </a:defRPr>
+    </a:lvl6pPr>
+    <a:lvl7pPr marL="2743200" algn="l" defTabSz="914400" rtl="0" eaLnBrk="1" latinLnBrk="0" hangingPunct="1">
+      <a:defRPr sz="1200" kern="1200">
+        <a:solidFill>
+          <a:schemeClr val="tx1"/>
+        </a:solidFill>
+        <a:latin typeface="+mn-lt"/>
+        <a:ea typeface="+mn-ea"/>
+        <a:cs typeface="+mn-cs"/>
+      </a:defRPr>
+    </a:lvl7pPr>
+    <a:lvl8pPr marL="3200400" algn="l" defTabSz="914400" rtl="0" eaLnBrk="1" latinLnBrk="0" hangingPunct="1">
+      <a:defRPr sz="1200" kern="1200">
+        <a:solidFill>
+          <a:schemeClr val="tx1"/>
+        </a:solidFill>
+        <a:latin typeface="+mn-lt"/>
+        <a:ea typeface="+mn-ea"/>
+        <a:cs typeface="+mn-cs"/>
+      </a:defRPr>
+    </a:lvl8pPr>
+    <a:lvl9pPr marL="3657600" algn="l" defTabSz="914400" rtl="0" eaLnBrk="1" latinLnBrk="0" hangingPunct="1">
+      <a:defRPr sz="1200" kern="1200">
+        <a:solidFill>
+          <a:schemeClr val="tx1"/>
+        </a:solidFill>
+        <a:latin typeface="+mn-lt"/>
+        <a:ea typeface="+mn-ea"/>
+        <a:cs typeface="+mn-cs"/>
+      </a:defRPr>
+    </a:lvl9pPr>
+  </p:notesStyle>
+</p:notesMaster>
+</file>
+
 <file path=ppt/slideLayouts/slideLayout1.xml><?xml version="1.0" encoding="utf-8"?>
 <p:sldLayout xmlns:a="http://schemas.openxmlformats.org/drawingml/2006/main" xmlns:r="http://schemas.openxmlformats.org/officeDocument/2006/relationships" xmlns:p="http://schemas.openxmlformats.org/presentationml/2006/main" showMasterSp="0" type="title" preserve="1">
   <p:cSld name="Title Slide">
@@ -5804,7 +6157,7 @@
             </a:lvl1pPr>
           </a:lstStyle>
           <a:p>
-            <a:fld id="{565C5295-D0C3-4D5C-872A-84B3C3C626EE}" type="datetimeFigureOut">
+            <a:fld id="{383E49F0-9158-4645-B2BB-8BDE95DF0CB0}" type="datetime1">
               <a:rPr lang="en-US" smtClean="0"/>
               <a:t>1/5/2012</a:t>
             </a:fld>
@@ -6089,7 +6442,7 @@
           <a:bodyPr/>
           <a:lstStyle/>
           <a:p>
-            <a:fld id="{565C5295-D0C3-4D5C-872A-84B3C3C626EE}" type="datetimeFigureOut">
+            <a:fld id="{B87F77C1-CAE8-4630-8486-4C6A4E764E95}" type="datetime1">
               <a:rPr lang="en-US" smtClean="0"/>
               <a:t>1/5/2012</a:t>
             </a:fld>
@@ -6264,7 +6617,7 @@
           <a:bodyPr/>
           <a:lstStyle/>
           <a:p>
-            <a:fld id="{565C5295-D0C3-4D5C-872A-84B3C3C626EE}" type="datetimeFigureOut">
+            <a:fld id="{1E739776-4BD3-4FFF-8EC4-84FBB4FAAF12}" type="datetime1">
               <a:rPr lang="en-US" smtClean="0"/>
               <a:t>1/5/2012</a:t>
             </a:fld>
@@ -6429,7 +6782,7 @@
           <a:bodyPr/>
           <a:lstStyle/>
           <a:p>
-            <a:fld id="{565C5295-D0C3-4D5C-872A-84B3C3C626EE}" type="datetimeFigureOut">
+            <a:fld id="{5AF5E7F0-7DDE-4DA2-89F0-BCA55D525CE6}" type="datetime1">
               <a:rPr lang="en-US" smtClean="0"/>
               <a:t>1/5/2012</a:t>
             </a:fld>
@@ -6670,7 +7023,7 @@
           <a:bodyPr/>
           <a:lstStyle/>
           <a:p>
-            <a:fld id="{565C5295-D0C3-4D5C-872A-84B3C3C626EE}" type="datetimeFigureOut">
+            <a:fld id="{99824FD6-E96E-4FC9-8960-424949C4AF00}" type="datetime1">
               <a:rPr lang="en-US" smtClean="0"/>
               <a:t>1/5/2012</a:t>
             </a:fld>
@@ -6783,7 +7136,7 @@
           <a:bodyPr/>
           <a:lstStyle/>
           <a:p>
-            <a:fld id="{565C5295-D0C3-4D5C-872A-84B3C3C626EE}" type="datetimeFigureOut">
+            <a:fld id="{1A7E93DC-E315-4BD9-A262-0DD84392964E}" type="datetime1">
               <a:rPr lang="en-US" smtClean="0"/>
               <a:t>1/5/2012</a:t>
             </a:fld>
@@ -7322,7 +7675,7 @@
           <a:bodyPr/>
           <a:lstStyle/>
           <a:p>
-            <a:fld id="{565C5295-D0C3-4D5C-872A-84B3C3C626EE}" type="datetimeFigureOut">
+            <a:fld id="{6009EF7D-D599-481E-811C-87E026B57878}" type="datetime1">
               <a:rPr lang="en-US" smtClean="0"/>
               <a:t>1/5/2012</a:t>
             </a:fld>
@@ -7435,7 +7788,7 @@
           <a:bodyPr/>
           <a:lstStyle/>
           <a:p>
-            <a:fld id="{565C5295-D0C3-4D5C-872A-84B3C3C626EE}" type="datetimeFigureOut">
+            <a:fld id="{427D3D6D-2A4C-4BE8-8540-A75A32397DE8}" type="datetime1">
               <a:rPr lang="en-US" smtClean="0"/>
               <a:t>1/5/2012</a:t>
             </a:fld>
@@ -7525,7 +7878,7 @@
           <a:bodyPr/>
           <a:lstStyle/>
           <a:p>
-            <a:fld id="{565C5295-D0C3-4D5C-872A-84B3C3C626EE}" type="datetimeFigureOut">
+            <a:fld id="{6DBB0057-3F15-483A-9C1C-B2CDF9FD5822}" type="datetime1">
               <a:rPr lang="en-US" smtClean="0"/>
               <a:t>1/5/2012</a:t>
             </a:fld>
@@ -10176,7 +10529,7 @@
           <a:bodyPr/>
           <a:lstStyle/>
           <a:p>
-            <a:fld id="{565C5295-D0C3-4D5C-872A-84B3C3C626EE}" type="datetimeFigureOut">
+            <a:fld id="{92323B2E-9B5D-4D5E-93E2-243E00AE2674}" type="datetime1">
               <a:rPr lang="en-US" smtClean="0"/>
               <a:t>1/5/2012</a:t>
             </a:fld>
@@ -13388,7 +13741,7 @@
           <a:bodyPr/>
           <a:lstStyle/>
           <a:p>
-            <a:fld id="{565C5295-D0C3-4D5C-872A-84B3C3C626EE}" type="datetimeFigureOut">
+            <a:fld id="{52AFCD00-ED71-42AB-8295-89B4DBCDAB42}" type="datetime1">
               <a:rPr lang="en-US" smtClean="0"/>
               <a:t>1/5/2012</a:t>
             </a:fld>
@@ -16210,7 +16563,7 @@
             </a:lvl1pPr>
           </a:lstStyle>
           <a:p>
-            <a:fld id="{565C5295-D0C3-4D5C-872A-84B3C3C626EE}" type="datetimeFigureOut">
+            <a:fld id="{2673B9DE-532C-42D9-A121-DAA83BF6090E}" type="datetime1">
               <a:rPr lang="en-US" smtClean="0"/>
               <a:t>1/5/2012</a:t>
             </a:fld>
@@ -16308,6 +16661,7 @@
     <p:sldLayoutId id="2147483706" r:id="rId10"/>
     <p:sldLayoutId id="2147483707" r:id="rId11"/>
   </p:sldLayoutIdLst>
+  <p:hf hdr="0" ftr="0" dt="0"/>
   <p:txStyles>
     <p:titleStyle>
       <a:lvl1pPr algn="l" defTabSz="914400" rtl="0" eaLnBrk="1" latinLnBrk="0" hangingPunct="1">
@@ -16709,9 +17063,48 @@
           <a:lstStyle/>
           <a:p>
             <a:r>
+              <a:rPr lang="fr-FR" dirty="0" err="1"/>
+              <a:t>a</a:t>
+            </a:r>
+            <a:r>
+              <a:rPr lang="fr-FR" dirty="0" err="1" smtClean="0"/>
+              <a:t>ncel_a</a:t>
+            </a:r>
+            <a:r>
               <a:rPr lang="fr-FR" dirty="0" smtClean="0"/>
-              <a:t>Ancel_a, Creuso_a, chanio_f</a:t>
+              <a:t>, </a:t>
             </a:r>
+            <a:r>
+              <a:rPr lang="fr-FR" dirty="0" err="1" smtClean="0"/>
+              <a:t>creuso_a</a:t>
+            </a:r>
+            <a:r>
+              <a:rPr lang="fr-FR" dirty="0" smtClean="0"/>
+              <a:t>, chanio_f</a:t>
+            </a:r>
+            <a:endParaRPr lang="en-US" dirty="0"/>
+          </a:p>
+        </p:txBody>
+      </p:sp>
+      <p:sp>
+        <p:nvSpPr>
+          <p:cNvPr id="4" name="Slide Number Placeholder 3"/>
+          <p:cNvSpPr>
+            <a:spLocks noGrp="1"/>
+          </p:cNvSpPr>
+          <p:nvPr>
+            <p:ph type="sldNum" sz="quarter" idx="12"/>
+          </p:nvPr>
+        </p:nvSpPr>
+        <p:spPr/>
+        <p:txBody>
+          <a:bodyPr/>
+          <a:lstStyle/>
+          <a:p>
+            <a:fld id="{8BAAF0B6-2BEA-4050-93E2-11DE2E69EC2C}" type="slidenum">
+              <a:rPr lang="en-US" smtClean="0"/>
+              <a:t>1</a:t>
+            </a:fld>
             <a:endParaRPr lang="en-US" dirty="0"/>
           </a:p>
         </p:txBody>
@@ -16726,6 +17119,21 @@
   <p:clrMapOvr>
     <a:masterClrMapping/>
   </p:clrMapOvr>
+  <mc:AlternateContent xmlns:mc="http://schemas.openxmlformats.org/markup-compatibility/2006" xmlns:p14="http://schemas.microsoft.com/office/powerpoint/2010/main">
+    <mc:Choice Requires="p14">
+      <p:transition p14:dur="0"/>
+    </mc:Choice>
+    <mc:Fallback xmlns="">
+      <p:transition/>
+    </mc:Fallback>
+  </mc:AlternateContent>
+  <p:timing>
+    <p:tnLst>
+      <p:par>
+        <p:cTn id="1" dur="indefinite" restart="never" nodeType="tmRoot"/>
+      </p:par>
+    </p:tnLst>
+  </p:timing>
 </p:sld>
 </file>
 
@@ -16837,6 +17245,29 @@
           </a:p>
         </p:txBody>
       </p:sp>
+      <p:sp>
+        <p:nvSpPr>
+          <p:cNvPr id="4" name="Slide Number Placeholder 3"/>
+          <p:cNvSpPr>
+            <a:spLocks noGrp="1"/>
+          </p:cNvSpPr>
+          <p:nvPr>
+            <p:ph type="sldNum" sz="quarter" idx="12"/>
+          </p:nvPr>
+        </p:nvSpPr>
+        <p:spPr/>
+        <p:txBody>
+          <a:bodyPr/>
+          <a:lstStyle/>
+          <a:p>
+            <a:fld id="{8BAAF0B6-2BEA-4050-93E2-11DE2E69EC2C}" type="slidenum">
+              <a:rPr lang="en-US" smtClean="0"/>
+              <a:t>2</a:t>
+            </a:fld>
+            <a:endParaRPr lang="en-US" dirty="0"/>
+          </a:p>
+        </p:txBody>
+      </p:sp>
     </p:spTree>
     <p:extLst>
       <p:ext uri="{BB962C8B-B14F-4D97-AF65-F5344CB8AC3E}">
@@ -16847,6 +17278,13 @@
   <p:clrMapOvr>
     <a:masterClrMapping/>
   </p:clrMapOvr>
+  <p:timing>
+    <p:tnLst>
+      <p:par>
+        <p:cTn id="1" dur="indefinite" restart="never" nodeType="tmRoot"/>
+      </p:par>
+    </p:tnLst>
+  </p:timing>
 </p:sld>
 </file>
 
@@ -16944,6 +17382,29 @@
           </a:p>
         </p:txBody>
       </p:sp>
+      <p:sp>
+        <p:nvSpPr>
+          <p:cNvPr id="4" name="Slide Number Placeholder 3"/>
+          <p:cNvSpPr>
+            <a:spLocks noGrp="1"/>
+          </p:cNvSpPr>
+          <p:nvPr>
+            <p:ph type="sldNum" sz="quarter" idx="12"/>
+          </p:nvPr>
+        </p:nvSpPr>
+        <p:spPr/>
+        <p:txBody>
+          <a:bodyPr/>
+          <a:lstStyle/>
+          <a:p>
+            <a:fld id="{8BAAF0B6-2BEA-4050-93E2-11DE2E69EC2C}" type="slidenum">
+              <a:rPr lang="en-US" smtClean="0"/>
+              <a:t>3</a:t>
+            </a:fld>
+            <a:endParaRPr lang="en-US" dirty="0"/>
+          </a:p>
+        </p:txBody>
+      </p:sp>
     </p:spTree>
     <p:extLst>
       <p:ext uri="{BB962C8B-B14F-4D97-AF65-F5344CB8AC3E}">
@@ -17022,6 +17483,29 @@
           </a:graphicData>
         </a:graphic>
       </p:graphicFrame>
+      <p:sp>
+        <p:nvSpPr>
+          <p:cNvPr id="3" name="Slide Number Placeholder 2"/>
+          <p:cNvSpPr>
+            <a:spLocks noGrp="1"/>
+          </p:cNvSpPr>
+          <p:nvPr>
+            <p:ph type="sldNum" sz="quarter" idx="12"/>
+          </p:nvPr>
+        </p:nvSpPr>
+        <p:spPr/>
+        <p:txBody>
+          <a:bodyPr/>
+          <a:lstStyle/>
+          <a:p>
+            <a:fld id="{8BAAF0B6-2BEA-4050-93E2-11DE2E69EC2C}" type="slidenum">
+              <a:rPr lang="en-US" smtClean="0"/>
+              <a:t>4</a:t>
+            </a:fld>
+            <a:endParaRPr lang="en-US" dirty="0"/>
+          </a:p>
+        </p:txBody>
+      </p:sp>
     </p:spTree>
     <p:extLst>
       <p:ext uri="{BB962C8B-B14F-4D97-AF65-F5344CB8AC3E}">
@@ -17125,6 +17609,29 @@
           </a:p>
         </p:txBody>
       </p:sp>
+      <p:sp>
+        <p:nvSpPr>
+          <p:cNvPr id="4" name="Slide Number Placeholder 3"/>
+          <p:cNvSpPr>
+            <a:spLocks noGrp="1"/>
+          </p:cNvSpPr>
+          <p:nvPr>
+            <p:ph type="sldNum" sz="quarter" idx="12"/>
+          </p:nvPr>
+        </p:nvSpPr>
+        <p:spPr/>
+        <p:txBody>
+          <a:bodyPr/>
+          <a:lstStyle/>
+          <a:p>
+            <a:fld id="{8BAAF0B6-2BEA-4050-93E2-11DE2E69EC2C}" type="slidenum">
+              <a:rPr lang="en-US" smtClean="0"/>
+              <a:t>5</a:t>
+            </a:fld>
+            <a:endParaRPr lang="en-US" dirty="0"/>
+          </a:p>
+        </p:txBody>
+      </p:sp>
     </p:spTree>
     <p:extLst>
       <p:ext uri="{BB962C8B-B14F-4D97-AF65-F5344CB8AC3E}">
@@ -17135,6 +17642,13 @@
   <p:clrMapOvr>
     <a:masterClrMapping/>
   </p:clrMapOvr>
+  <p:timing>
+    <p:tnLst>
+      <p:par>
+        <p:cTn id="1" dur="indefinite" restart="never" nodeType="tmRoot"/>
+      </p:par>
+    </p:tnLst>
+  </p:timing>
 </p:sld>
 </file>
 
@@ -17227,6 +17741,29 @@
           </a:p>
         </p:txBody>
       </p:sp>
+      <p:sp>
+        <p:nvSpPr>
+          <p:cNvPr id="4" name="Slide Number Placeholder 3"/>
+          <p:cNvSpPr>
+            <a:spLocks noGrp="1"/>
+          </p:cNvSpPr>
+          <p:nvPr>
+            <p:ph type="sldNum" sz="quarter" idx="12"/>
+          </p:nvPr>
+        </p:nvSpPr>
+        <p:spPr/>
+        <p:txBody>
+          <a:bodyPr/>
+          <a:lstStyle/>
+          <a:p>
+            <a:fld id="{8BAAF0B6-2BEA-4050-93E2-11DE2E69EC2C}" type="slidenum">
+              <a:rPr lang="en-US" smtClean="0"/>
+              <a:t>6</a:t>
+            </a:fld>
+            <a:endParaRPr lang="en-US" dirty="0"/>
+          </a:p>
+        </p:txBody>
+      </p:sp>
     </p:spTree>
     <p:extLst>
       <p:ext uri="{BB962C8B-B14F-4D97-AF65-F5344CB8AC3E}">
@@ -17237,6 +17774,13 @@
   <p:clrMapOvr>
     <a:masterClrMapping/>
   </p:clrMapOvr>
+  <p:timing>
+    <p:tnLst>
+      <p:par>
+        <p:cTn id="1" dur="indefinite" restart="never" nodeType="tmRoot"/>
+      </p:par>
+    </p:tnLst>
+  </p:timing>
 </p:sld>
 </file>
 
@@ -17303,23 +17847,43 @@
           <a:p>
             <a:r>
               <a:rPr lang="fr-FR" dirty="0" smtClean="0"/>
-              <a:t>74 neurones en entrée (les case vue, la faim, et la précédente sortie)</a:t>
-            </a:r>
-          </a:p>
-          <a:p>
-            <a:r>
-              <a:rPr lang="fr-FR" smtClean="0"/>
-              <a:t>50 neurones </a:t>
+              <a:t>74</a:t>
             </a:r>
             <a:r>
               <a:rPr lang="fr-FR" dirty="0" smtClean="0"/>
-              <a:t>pour la première couche caché</a:t>
+              <a:t> </a:t>
+            </a:r>
+            <a:r>
+              <a:rPr lang="fr-FR" dirty="0" smtClean="0"/>
+              <a:t>neurones en entrée (les case vue, la faim, et la précédente sortie)</a:t>
             </a:r>
           </a:p>
           <a:p>
             <a:r>
               <a:rPr lang="fr-FR" dirty="0" smtClean="0"/>
-              <a:t>36 neurones pour la deuxième.</a:t>
+              <a:t>148</a:t>
+            </a:r>
+            <a:r>
+              <a:rPr lang="fr-FR" dirty="0" smtClean="0"/>
+              <a:t> </a:t>
+            </a:r>
+            <a:r>
+              <a:rPr lang="fr-FR" dirty="0" smtClean="0"/>
+              <a:t>neurones pour la première couche caché</a:t>
+            </a:r>
+          </a:p>
+          <a:p>
+            <a:r>
+              <a:rPr lang="fr-FR" dirty="0" smtClean="0"/>
+              <a:t>74</a:t>
+            </a:r>
+            <a:r>
+              <a:rPr lang="fr-FR" dirty="0" smtClean="0"/>
+              <a:t> </a:t>
+            </a:r>
+            <a:r>
+              <a:rPr lang="fr-FR" dirty="0" smtClean="0"/>
+              <a:t>neurones pour la deuxième.</a:t>
             </a:r>
           </a:p>
           <a:p>
@@ -17331,8 +17895,39 @@
           <a:p>
             <a:r>
               <a:rPr lang="fr-FR" dirty="0" smtClean="0"/>
-              <a:t>Learning rate : 0.4f</a:t>
+              <a:t>Learning rate </a:t>
             </a:r>
+            <a:r>
+              <a:rPr lang="fr-FR" smtClean="0"/>
+              <a:t>: </a:t>
+            </a:r>
+            <a:r>
+              <a:rPr lang="fr-FR" smtClean="0"/>
+              <a:t>0.5f</a:t>
+            </a:r>
+            <a:endParaRPr lang="en-US" dirty="0"/>
+          </a:p>
+        </p:txBody>
+      </p:sp>
+      <p:sp>
+        <p:nvSpPr>
+          <p:cNvPr id="4" name="Slide Number Placeholder 3"/>
+          <p:cNvSpPr>
+            <a:spLocks noGrp="1"/>
+          </p:cNvSpPr>
+          <p:nvPr>
+            <p:ph type="sldNum" sz="quarter" idx="12"/>
+          </p:nvPr>
+        </p:nvSpPr>
+        <p:spPr/>
+        <p:txBody>
+          <a:bodyPr/>
+          <a:lstStyle/>
+          <a:p>
+            <a:fld id="{8BAAF0B6-2BEA-4050-93E2-11DE2E69EC2C}" type="slidenum">
+              <a:rPr lang="en-US" smtClean="0"/>
+              <a:t>7</a:t>
+            </a:fld>
             <a:endParaRPr lang="en-US" dirty="0"/>
           </a:p>
         </p:txBody>
@@ -17347,6 +17942,13 @@
   <p:clrMapOvr>
     <a:masterClrMapping/>
   </p:clrMapOvr>
+  <p:timing>
+    <p:tnLst>
+      <p:par>
+        <p:cTn id="1" dur="indefinite" restart="never" nodeType="tmRoot"/>
+      </p:par>
+    </p:tnLst>
+  </p:timing>
 </p:sld>
 </file>
 
@@ -17435,6 +18037,29 @@
           </a:p>
         </p:txBody>
       </p:sp>
+      <p:sp>
+        <p:nvSpPr>
+          <p:cNvPr id="4" name="Slide Number Placeholder 3"/>
+          <p:cNvSpPr>
+            <a:spLocks noGrp="1"/>
+          </p:cNvSpPr>
+          <p:nvPr>
+            <p:ph type="sldNum" sz="quarter" idx="12"/>
+          </p:nvPr>
+        </p:nvSpPr>
+        <p:spPr/>
+        <p:txBody>
+          <a:bodyPr/>
+          <a:lstStyle/>
+          <a:p>
+            <a:fld id="{8BAAF0B6-2BEA-4050-93E2-11DE2E69EC2C}" type="slidenum">
+              <a:rPr lang="en-US" smtClean="0"/>
+              <a:t>8</a:t>
+            </a:fld>
+            <a:endParaRPr lang="en-US" dirty="0"/>
+          </a:p>
+        </p:txBody>
+      </p:sp>
     </p:spTree>
     <p:extLst>
       <p:ext uri="{BB962C8B-B14F-4D97-AF65-F5344CB8AC3E}">
@@ -17445,6 +18070,13 @@
   <p:clrMapOvr>
     <a:masterClrMapping/>
   </p:clrMapOvr>
+  <p:timing>
+    <p:tnLst>
+      <p:par>
+        <p:cTn id="1" dur="indefinite" restart="never" nodeType="tmRoot"/>
+      </p:par>
+    </p:tnLst>
+  </p:timing>
 </p:sld>
 </file>
 
@@ -17732,4 +18364,289 @@
   <a:objectDefaults/>
   <a:extraClrSchemeLst/>
 </a:theme>
+</file>
+
+<file path=ppt/theme/theme2.xml><?xml version="1.0" encoding="utf-8"?>
+<a:theme xmlns:a="http://schemas.openxmlformats.org/drawingml/2006/main" name="Office Theme">
+  <a:themeElements>
+    <a:clrScheme name="Office">
+      <a:dk1>
+        <a:sysClr val="windowText" lastClr="000000"/>
+      </a:dk1>
+      <a:lt1>
+        <a:sysClr val="window" lastClr="FFFFFF"/>
+      </a:lt1>
+      <a:dk2>
+        <a:srgbClr val="1F497D"/>
+      </a:dk2>
+      <a:lt2>
+        <a:srgbClr val="EEECE1"/>
+      </a:lt2>
+      <a:accent1>
+        <a:srgbClr val="4F81BD"/>
+      </a:accent1>
+      <a:accent2>
+        <a:srgbClr val="C0504D"/>
+      </a:accent2>
+      <a:accent3>
+        <a:srgbClr val="9BBB59"/>
+      </a:accent3>
+      <a:accent4>
+        <a:srgbClr val="8064A2"/>
+      </a:accent4>
+      <a:accent5>
+        <a:srgbClr val="4BACC6"/>
+      </a:accent5>
+      <a:accent6>
+        <a:srgbClr val="F79646"/>
+      </a:accent6>
+      <a:hlink>
+        <a:srgbClr val="0000FF"/>
+      </a:hlink>
+      <a:folHlink>
+        <a:srgbClr val="800080"/>
+      </a:folHlink>
+    </a:clrScheme>
+    <a:fontScheme name="Office">
+      <a:majorFont>
+        <a:latin typeface="Calibri"/>
+        <a:ea typeface=""/>
+        <a:cs typeface=""/>
+        <a:font script="Jpan" typeface="ＭＳ Ｐゴシック"/>
+        <a:font script="Hang" typeface="맑은 고딕"/>
+        <a:font script="Hans" typeface="宋体"/>
+        <a:font script="Hant" typeface="新細明體"/>
+        <a:font script="Arab" typeface="Times New Roman"/>
+        <a:font script="Hebr" typeface="Times New Roman"/>
+        <a:font script="Thai" typeface="Angsana New"/>
+        <a:font script="Ethi" typeface="Nyala"/>
+        <a:font script="Beng" typeface="Vrinda"/>
+        <a:font script="Gujr" typeface="Shruti"/>
+        <a:font script="Khmr" typeface="MoolBoran"/>
+        <a:font script="Knda" typeface="Tunga"/>
+        <a:font script="Guru" typeface="Raavi"/>
+        <a:font script="Cans" typeface="Euphemia"/>
+        <a:font script="Cher" typeface="Plantagenet Cherokee"/>
+        <a:font script="Yiii" typeface="Microsoft Yi Baiti"/>
+        <a:font script="Tibt" typeface="Microsoft Himalaya"/>
+        <a:font script="Thaa" typeface="MV Boli"/>
+        <a:font script="Deva" typeface="Mangal"/>
+        <a:font script="Telu" typeface="Gautami"/>
+        <a:font script="Taml" typeface="Latha"/>
+        <a:font script="Syrc" typeface="Estrangelo Edessa"/>
+        <a:font script="Orya" typeface="Kalinga"/>
+        <a:font script="Mlym" typeface="Kartika"/>
+        <a:font script="Laoo" typeface="DokChampa"/>
+        <a:font script="Sinh" typeface="Iskoola Pota"/>
+        <a:font script="Mong" typeface="Mongolian Baiti"/>
+        <a:font script="Viet" typeface="Times New Roman"/>
+        <a:font script="Uigh" typeface="Microsoft Uighur"/>
+        <a:font script="Geor" typeface="Sylfaen"/>
+      </a:majorFont>
+      <a:minorFont>
+        <a:latin typeface="Calibri"/>
+        <a:ea typeface=""/>
+        <a:cs typeface=""/>
+        <a:font script="Jpan" typeface="ＭＳ Ｐゴシック"/>
+        <a:font script="Hang" typeface="맑은 고딕"/>
+        <a:font script="Hans" typeface="宋体"/>
+        <a:font script="Hant" typeface="新細明體"/>
+        <a:font script="Arab" typeface="Arial"/>
+        <a:font script="Hebr" typeface="Arial"/>
+        <a:font script="Thai" typeface="Cordia New"/>
+        <a:font script="Ethi" typeface="Nyala"/>
+        <a:font script="Beng" typeface="Vrinda"/>
+        <a:font script="Gujr" typeface="Shruti"/>
+        <a:font script="Khmr" typeface="DaunPenh"/>
+        <a:font script="Knda" typeface="Tunga"/>
+        <a:font script="Guru" typeface="Raavi"/>
+        <a:font script="Cans" typeface="Euphemia"/>
+        <a:font script="Cher" typeface="Plantagenet Cherokee"/>
+        <a:font script="Yiii" typeface="Microsoft Yi Baiti"/>
+        <a:font script="Tibt" typeface="Microsoft Himalaya"/>
+        <a:font script="Thaa" typeface="MV Boli"/>
+        <a:font script="Deva" typeface="Mangal"/>
+        <a:font script="Telu" typeface="Gautami"/>
+        <a:font script="Taml" typeface="Latha"/>
+        <a:font script="Syrc" typeface="Estrangelo Edessa"/>
+        <a:font script="Orya" typeface="Kalinga"/>
+        <a:font script="Mlym" typeface="Kartika"/>
+        <a:font script="Laoo" typeface="DokChampa"/>
+        <a:font script="Sinh" typeface="Iskoola Pota"/>
+        <a:font script="Mong" typeface="Mongolian Baiti"/>
+        <a:font script="Viet" typeface="Arial"/>
+        <a:font script="Uigh" typeface="Microsoft Uighur"/>
+        <a:font script="Geor" typeface="Sylfaen"/>
+      </a:minorFont>
+    </a:fontScheme>
+    <a:fmtScheme name="Office">
+      <a:fillStyleLst>
+        <a:solidFill>
+          <a:schemeClr val="phClr"/>
+        </a:solidFill>
+        <a:gradFill rotWithShape="1">
+          <a:gsLst>
+            <a:gs pos="0">
+              <a:schemeClr val="phClr">
+                <a:tint val="50000"/>
+                <a:satMod val="300000"/>
+              </a:schemeClr>
+            </a:gs>
+            <a:gs pos="35000">
+              <a:schemeClr val="phClr">
+                <a:tint val="37000"/>
+                <a:satMod val="300000"/>
+              </a:schemeClr>
+            </a:gs>
+            <a:gs pos="100000">
+              <a:schemeClr val="phClr">
+                <a:tint val="15000"/>
+                <a:satMod val="350000"/>
+              </a:schemeClr>
+            </a:gs>
+          </a:gsLst>
+          <a:lin ang="16200000" scaled="1"/>
+        </a:gradFill>
+        <a:gradFill rotWithShape="1">
+          <a:gsLst>
+            <a:gs pos="0">
+              <a:schemeClr val="phClr">
+                <a:shade val="51000"/>
+                <a:satMod val="130000"/>
+              </a:schemeClr>
+            </a:gs>
+            <a:gs pos="80000">
+              <a:schemeClr val="phClr">
+                <a:shade val="93000"/>
+                <a:satMod val="130000"/>
+              </a:schemeClr>
+            </a:gs>
+            <a:gs pos="100000">
+              <a:schemeClr val="phClr">
+                <a:shade val="94000"/>
+                <a:satMod val="135000"/>
+              </a:schemeClr>
+            </a:gs>
+          </a:gsLst>
+          <a:lin ang="16200000" scaled="0"/>
+        </a:gradFill>
+      </a:fillStyleLst>
+      <a:lnStyleLst>
+        <a:ln w="9525" cap="flat" cmpd="sng" algn="ctr">
+          <a:solidFill>
+            <a:schemeClr val="phClr">
+              <a:shade val="95000"/>
+              <a:satMod val="105000"/>
+            </a:schemeClr>
+          </a:solidFill>
+          <a:prstDash val="solid"/>
+        </a:ln>
+        <a:ln w="25400" cap="flat" cmpd="sng" algn="ctr">
+          <a:solidFill>
+            <a:schemeClr val="phClr"/>
+          </a:solidFill>
+          <a:prstDash val="solid"/>
+        </a:ln>
+        <a:ln w="38100" cap="flat" cmpd="sng" algn="ctr">
+          <a:solidFill>
+            <a:schemeClr val="phClr"/>
+          </a:solidFill>
+          <a:prstDash val="solid"/>
+        </a:ln>
+      </a:lnStyleLst>
+      <a:effectStyleLst>
+        <a:effectStyle>
+          <a:effectLst>
+            <a:outerShdw blurRad="40000" dist="20000" dir="5400000" rotWithShape="0">
+              <a:srgbClr val="000000">
+                <a:alpha val="38000"/>
+              </a:srgbClr>
+            </a:outerShdw>
+          </a:effectLst>
+        </a:effectStyle>
+        <a:effectStyle>
+          <a:effectLst>
+            <a:outerShdw blurRad="40000" dist="23000" dir="5400000" rotWithShape="0">
+              <a:srgbClr val="000000">
+                <a:alpha val="35000"/>
+              </a:srgbClr>
+            </a:outerShdw>
+          </a:effectLst>
+        </a:effectStyle>
+        <a:effectStyle>
+          <a:effectLst>
+            <a:outerShdw blurRad="40000" dist="23000" dir="5400000" rotWithShape="0">
+              <a:srgbClr val="000000">
+                <a:alpha val="35000"/>
+              </a:srgbClr>
+            </a:outerShdw>
+          </a:effectLst>
+          <a:scene3d>
+            <a:camera prst="orthographicFront">
+              <a:rot lat="0" lon="0" rev="0"/>
+            </a:camera>
+            <a:lightRig rig="threePt" dir="t">
+              <a:rot lat="0" lon="0" rev="1200000"/>
+            </a:lightRig>
+          </a:scene3d>
+          <a:sp3d>
+            <a:bevelT w="63500" h="25400"/>
+          </a:sp3d>
+        </a:effectStyle>
+      </a:effectStyleLst>
+      <a:bgFillStyleLst>
+        <a:solidFill>
+          <a:schemeClr val="phClr"/>
+        </a:solidFill>
+        <a:gradFill rotWithShape="1">
+          <a:gsLst>
+            <a:gs pos="0">
+              <a:schemeClr val="phClr">
+                <a:tint val="40000"/>
+                <a:satMod val="350000"/>
+              </a:schemeClr>
+            </a:gs>
+            <a:gs pos="40000">
+              <a:schemeClr val="phClr">
+                <a:tint val="45000"/>
+                <a:shade val="99000"/>
+                <a:satMod val="350000"/>
+              </a:schemeClr>
+            </a:gs>
+            <a:gs pos="100000">
+              <a:schemeClr val="phClr">
+                <a:shade val="20000"/>
+                <a:satMod val="255000"/>
+              </a:schemeClr>
+            </a:gs>
+          </a:gsLst>
+          <a:path path="circle">
+            <a:fillToRect l="50000" t="-80000" r="50000" b="180000"/>
+          </a:path>
+        </a:gradFill>
+        <a:gradFill rotWithShape="1">
+          <a:gsLst>
+            <a:gs pos="0">
+              <a:schemeClr val="phClr">
+                <a:tint val="80000"/>
+                <a:satMod val="300000"/>
+              </a:schemeClr>
+            </a:gs>
+            <a:gs pos="100000">
+              <a:schemeClr val="phClr">
+                <a:shade val="30000"/>
+                <a:satMod val="200000"/>
+              </a:schemeClr>
+            </a:gs>
+          </a:gsLst>
+          <a:path path="circle">
+            <a:fillToRect l="50000" t="50000" r="50000" b="50000"/>
+          </a:path>
+        </a:gradFill>
+      </a:bgFillStyleLst>
+    </a:fmtScheme>
+  </a:themeElements>
+  <a:objectDefaults/>
+  <a:extraClrSchemeLst/>
+</a:theme>
 </file>
</xml_diff>

<commit_message>
Maj du ppt Correction des poid pour le loup Rajout de virtual pour les entity
</commit_message>
<xml_diff>
--- a/Pattern Matcher.pptx
+++ b/Pattern Matcher.pptx
@@ -5,17 +5,18 @@
     <p:sldMasterId id="2147483696" r:id="rId1"/>
   </p:sldMasterIdLst>
   <p:notesMasterIdLst>
-    <p:notesMasterId r:id="rId10"/>
+    <p:notesMasterId r:id="rId11"/>
   </p:notesMasterIdLst>
   <p:sldIdLst>
     <p:sldId id="256" r:id="rId2"/>
     <p:sldId id="257" r:id="rId3"/>
-    <p:sldId id="258" r:id="rId4"/>
-    <p:sldId id="259" r:id="rId5"/>
-    <p:sldId id="260" r:id="rId6"/>
+    <p:sldId id="259" r:id="rId4"/>
+    <p:sldId id="260" r:id="rId5"/>
+    <p:sldId id="262" r:id="rId6"/>
     <p:sldId id="261" r:id="rId7"/>
-    <p:sldId id="262" r:id="rId8"/>
+    <p:sldId id="264" r:id="rId8"/>
     <p:sldId id="263" r:id="rId9"/>
+    <p:sldId id="258" r:id="rId10"/>
   </p:sldIdLst>
   <p:sldSz cx="9144000" cy="6858000" type="screen4x3"/>
   <p:notesSz cx="6858000" cy="9144000"/>
@@ -3134,7 +3135,7 @@
           <a:p>
             <a:fld id="{2A6D63A3-1AD1-4FBF-8B0E-5B941719642B}" type="datetimeFigureOut">
               <a:rPr lang="fr-FR" smtClean="0"/>
-              <a:t>05/01/2012</a:t>
+              <a:t>15/02/2012</a:t>
             </a:fld>
             <a:endParaRPr lang="fr-FR"/>
           </a:p>
@@ -6159,7 +6160,7 @@
           <a:p>
             <a:fld id="{383E49F0-9158-4645-B2BB-8BDE95DF0CB0}" type="datetime1">
               <a:rPr lang="en-US" smtClean="0"/>
-              <a:t>1/5/2012</a:t>
+              <a:t>2/15/2012</a:t>
             </a:fld>
             <a:endParaRPr lang="en-US" dirty="0"/>
           </a:p>
@@ -6444,7 +6445,7 @@
           <a:p>
             <a:fld id="{B87F77C1-CAE8-4630-8486-4C6A4E764E95}" type="datetime1">
               <a:rPr lang="en-US" smtClean="0"/>
-              <a:t>1/5/2012</a:t>
+              <a:t>2/15/2012</a:t>
             </a:fld>
             <a:endParaRPr lang="en-US" dirty="0"/>
           </a:p>
@@ -6619,7 +6620,7 @@
           <a:p>
             <a:fld id="{1E739776-4BD3-4FFF-8EC4-84FBB4FAAF12}" type="datetime1">
               <a:rPr lang="en-US" smtClean="0"/>
-              <a:t>1/5/2012</a:t>
+              <a:t>2/15/2012</a:t>
             </a:fld>
             <a:endParaRPr lang="en-US" dirty="0"/>
           </a:p>
@@ -6784,7 +6785,7 @@
           <a:p>
             <a:fld id="{5AF5E7F0-7DDE-4DA2-89F0-BCA55D525CE6}" type="datetime1">
               <a:rPr lang="en-US" smtClean="0"/>
-              <a:t>1/5/2012</a:t>
+              <a:t>2/15/2012</a:t>
             </a:fld>
             <a:endParaRPr lang="en-US" dirty="0"/>
           </a:p>
@@ -7025,7 +7026,7 @@
           <a:p>
             <a:fld id="{99824FD6-E96E-4FC9-8960-424949C4AF00}" type="datetime1">
               <a:rPr lang="en-US" smtClean="0"/>
-              <a:t>1/5/2012</a:t>
+              <a:t>2/15/2012</a:t>
             </a:fld>
             <a:endParaRPr lang="en-US" dirty="0"/>
           </a:p>
@@ -7138,7 +7139,7 @@
           <a:p>
             <a:fld id="{1A7E93DC-E315-4BD9-A262-0DD84392964E}" type="datetime1">
               <a:rPr lang="en-US" smtClean="0"/>
-              <a:t>1/5/2012</a:t>
+              <a:t>2/15/2012</a:t>
             </a:fld>
             <a:endParaRPr lang="en-US" dirty="0"/>
           </a:p>
@@ -7677,7 +7678,7 @@
           <a:p>
             <a:fld id="{6009EF7D-D599-481E-811C-87E026B57878}" type="datetime1">
               <a:rPr lang="en-US" smtClean="0"/>
-              <a:t>1/5/2012</a:t>
+              <a:t>2/15/2012</a:t>
             </a:fld>
             <a:endParaRPr lang="en-US" dirty="0"/>
           </a:p>
@@ -7790,7 +7791,7 @@
           <a:p>
             <a:fld id="{427D3D6D-2A4C-4BE8-8540-A75A32397DE8}" type="datetime1">
               <a:rPr lang="en-US" smtClean="0"/>
-              <a:t>1/5/2012</a:t>
+              <a:t>2/15/2012</a:t>
             </a:fld>
             <a:endParaRPr lang="en-US" dirty="0"/>
           </a:p>
@@ -7880,7 +7881,7 @@
           <a:p>
             <a:fld id="{6DBB0057-3F15-483A-9C1C-B2CDF9FD5822}" type="datetime1">
               <a:rPr lang="en-US" smtClean="0"/>
-              <a:t>1/5/2012</a:t>
+              <a:t>2/15/2012</a:t>
             </a:fld>
             <a:endParaRPr lang="en-US" dirty="0"/>
           </a:p>
@@ -10531,7 +10532,7 @@
           <a:p>
             <a:fld id="{92323B2E-9B5D-4D5E-93E2-243E00AE2674}" type="datetime1">
               <a:rPr lang="en-US" smtClean="0"/>
-              <a:t>1/5/2012</a:t>
+              <a:t>2/15/2012</a:t>
             </a:fld>
             <a:endParaRPr lang="en-US" dirty="0"/>
           </a:p>
@@ -13743,7 +13744,7 @@
           <a:p>
             <a:fld id="{52AFCD00-ED71-42AB-8295-89B4DBCDAB42}" type="datetime1">
               <a:rPr lang="en-US" smtClean="0"/>
-              <a:t>1/5/2012</a:t>
+              <a:t>2/15/2012</a:t>
             </a:fld>
             <a:endParaRPr lang="en-US" dirty="0"/>
           </a:p>
@@ -16565,7 +16566,7 @@
           <a:p>
             <a:fld id="{2673B9DE-532C-42D9-A121-DAA83BF6090E}" type="datetime1">
               <a:rPr lang="en-US" smtClean="0"/>
-              <a:t>1/5/2012</a:t>
+              <a:t>2/15/2012</a:t>
             </a:fld>
             <a:endParaRPr lang="en-US" dirty="0"/>
           </a:p>
@@ -17322,136 +17323,6 @@
           <a:p>
             <a:r>
               <a:rPr lang="fr-FR" dirty="0" smtClean="0"/>
-              <a:t>Environnement des l'IA</a:t>
-            </a:r>
-            <a:endParaRPr lang="en-US" dirty="0"/>
-          </a:p>
-        </p:txBody>
-      </p:sp>
-      <p:sp>
-        <p:nvSpPr>
-          <p:cNvPr id="3" name="Content Placeholder 2"/>
-          <p:cNvSpPr>
-            <a:spLocks noGrp="1"/>
-          </p:cNvSpPr>
-          <p:nvPr>
-            <p:ph idx="1"/>
-          </p:nvPr>
-        </p:nvSpPr>
-        <p:spPr/>
-        <p:txBody>
-          <a:bodyPr/>
-          <a:lstStyle/>
-          <a:p>
-            <a:r>
-              <a:rPr lang="fr-FR" dirty="0" smtClean="0"/>
-              <a:t>Partiellement Observable</a:t>
-            </a:r>
-            <a:endParaRPr lang="fr-FR" dirty="0"/>
-          </a:p>
-          <a:p>
-            <a:r>
-              <a:rPr lang="fr-FR" dirty="0" smtClean="0"/>
-              <a:t>Continue (la simulation évolue).</a:t>
-            </a:r>
-            <a:endParaRPr lang="fr-FR" dirty="0"/>
-          </a:p>
-          <a:p>
-            <a:r>
-              <a:rPr lang="fr-FR" dirty="0" smtClean="0"/>
-              <a:t>Déterministe (par de jeux de hasard).</a:t>
-            </a:r>
-          </a:p>
-          <a:p>
-            <a:r>
-              <a:rPr lang="fr-FR" dirty="0" smtClean="0"/>
-              <a:t>Discrète.</a:t>
-            </a:r>
-          </a:p>
-          <a:p>
-            <a:r>
-              <a:rPr lang="fr-FR" dirty="0" smtClean="0"/>
-              <a:t>Compétitif</a:t>
-            </a:r>
-          </a:p>
-          <a:p>
-            <a:endParaRPr lang="fr-FR" dirty="0"/>
-          </a:p>
-          <a:p>
-            <a:endParaRPr lang="en-US" dirty="0"/>
-          </a:p>
-        </p:txBody>
-      </p:sp>
-      <p:sp>
-        <p:nvSpPr>
-          <p:cNvPr id="4" name="Slide Number Placeholder 3"/>
-          <p:cNvSpPr>
-            <a:spLocks noGrp="1"/>
-          </p:cNvSpPr>
-          <p:nvPr>
-            <p:ph type="sldNum" sz="quarter" idx="12"/>
-          </p:nvPr>
-        </p:nvSpPr>
-        <p:spPr/>
-        <p:txBody>
-          <a:bodyPr/>
-          <a:lstStyle/>
-          <a:p>
-            <a:fld id="{8BAAF0B6-2BEA-4050-93E2-11DE2E69EC2C}" type="slidenum">
-              <a:rPr lang="en-US" smtClean="0"/>
-              <a:t>3</a:t>
-            </a:fld>
-            <a:endParaRPr lang="en-US" dirty="0"/>
-          </a:p>
-        </p:txBody>
-      </p:sp>
-    </p:spTree>
-    <p:extLst>
-      <p:ext uri="{BB962C8B-B14F-4D97-AF65-F5344CB8AC3E}">
-        <p14:creationId xmlns:p14="http://schemas.microsoft.com/office/powerpoint/2010/main" val="1363514379"/>
-      </p:ext>
-    </p:extLst>
-  </p:cSld>
-  <p:clrMapOvr>
-    <a:masterClrMapping/>
-  </p:clrMapOvr>
-</p:sld>
-</file>
-
-<file path=ppt/slides/slide4.xml><?xml version="1.0" encoding="utf-8"?>
-<p:sld xmlns:a="http://schemas.openxmlformats.org/drawingml/2006/main" xmlns:r="http://schemas.openxmlformats.org/officeDocument/2006/relationships" xmlns:p="http://schemas.openxmlformats.org/presentationml/2006/main">
-  <p:cSld>
-    <p:spTree>
-      <p:nvGrpSpPr>
-        <p:cNvPr id="1" name=""/>
-        <p:cNvGrpSpPr/>
-        <p:nvPr/>
-      </p:nvGrpSpPr>
-      <p:grpSpPr>
-        <a:xfrm>
-          <a:off x="0" y="0"/>
-          <a:ext cx="0" cy="0"/>
-          <a:chOff x="0" y="0"/>
-          <a:chExt cx="0" cy="0"/>
-        </a:xfrm>
-      </p:grpSpPr>
-      <p:sp>
-        <p:nvSpPr>
-          <p:cNvPr id="2" name="Title 1"/>
-          <p:cNvSpPr>
-            <a:spLocks noGrp="1"/>
-          </p:cNvSpPr>
-          <p:nvPr>
-            <p:ph type="title"/>
-          </p:nvPr>
-        </p:nvSpPr>
-        <p:spPr/>
-        <p:txBody>
-          <a:bodyPr/>
-          <a:lstStyle/>
-          <a:p>
-            <a:r>
-              <a:rPr lang="fr-FR" dirty="0" smtClean="0"/>
               <a:t>Le système</a:t>
             </a:r>
             <a:endParaRPr lang="en-US" dirty="0"/>
@@ -17500,7 +17371,7 @@
           <a:p>
             <a:fld id="{8BAAF0B6-2BEA-4050-93E2-11DE2E69EC2C}" type="slidenum">
               <a:rPr lang="en-US" smtClean="0"/>
-              <a:t>4</a:t>
+              <a:t>3</a:t>
             </a:fld>
             <a:endParaRPr lang="en-US" dirty="0"/>
           </a:p>
@@ -17519,7 +17390,7 @@
 </p:sld>
 </file>
 
-<file path=ppt/slides/slide5.xml><?xml version="1.0" encoding="utf-8"?>
+<file path=ppt/slides/slide4.xml><?xml version="1.0" encoding="utf-8"?>
 <p:sld xmlns:a="http://schemas.openxmlformats.org/drawingml/2006/main" xmlns:r="http://schemas.openxmlformats.org/officeDocument/2006/relationships" xmlns:p="http://schemas.openxmlformats.org/presentationml/2006/main">
   <p:cSld>
     <p:spTree>
@@ -17553,7 +17424,7 @@
           <a:p>
             <a:r>
               <a:rPr lang="fr-FR" dirty="0" smtClean="0"/>
-              <a:t>Analyse de tendance</a:t>
+              <a:t>Les changements</a:t>
             </a:r>
             <a:endParaRPr lang="en-US" dirty="0"/>
           </a:p>
@@ -17571,39 +17442,238 @@
         </p:nvSpPr>
         <p:spPr/>
         <p:txBody>
-          <a:bodyPr/>
+          <a:bodyPr>
+            <a:normAutofit/>
+          </a:bodyPr>
           <a:lstStyle/>
           <a:p>
             <a:r>
               <a:rPr lang="fr-FR" dirty="0" smtClean="0"/>
-              <a:t>Pas de set prédéterminé.</a:t>
+              <a:t>Une partie du moteur logique refait.</a:t>
             </a:r>
-          </a:p>
-          <a:p>
             <a:endParaRPr lang="fr-FR" dirty="0"/>
           </a:p>
           <a:p>
             <a:r>
               <a:rPr lang="fr-FR" dirty="0" smtClean="0"/>
-              <a:t>Un choix basé sur une tendance</a:t>
+              <a:t>Grosse optimisation</a:t>
             </a:r>
-          </a:p>
-          <a:p>
             <a:endParaRPr lang="fr-FR" dirty="0"/>
           </a:p>
           <a:p>
             <a:r>
               <a:rPr lang="fr-FR" dirty="0" smtClean="0"/>
-              <a:t>Seuil décisionnel relatif aux autres neurones</a:t>
+              <a:t>Réécriture de la pousse de l’herbe.</a:t>
             </a:r>
-          </a:p>
-          <a:p>
-            <a:endParaRPr lang="fr-FR" dirty="0"/>
           </a:p>
           <a:p>
             <a:r>
               <a:rPr lang="fr-FR" dirty="0" smtClean="0"/>
-              <a:t>Random en dessous du seuil</a:t>
+              <a:t>Le réseau de neurone prend maintenant les 5 actions précédentes</a:t>
+            </a:r>
+          </a:p>
+          <a:p>
+            <a:endParaRPr lang="fr-FR" dirty="0" smtClean="0"/>
+          </a:p>
+          <a:p>
+            <a:r>
+              <a:rPr lang="fr-FR" dirty="0" smtClean="0"/>
+              <a:t>La mise en place de l’</a:t>
+            </a:r>
+            <a:r>
+              <a:rPr lang="fr-FR" dirty="0" err="1" smtClean="0"/>
+              <a:t>algo</a:t>
+            </a:r>
+            <a:r>
+              <a:rPr lang="fr-FR" dirty="0" smtClean="0"/>
+              <a:t> </a:t>
+            </a:r>
+            <a:r>
+              <a:rPr lang="fr-FR" dirty="0" err="1" smtClean="0"/>
+              <a:t>gen</a:t>
+            </a:r>
+            <a:r>
+              <a:rPr lang="fr-FR" dirty="0" smtClean="0"/>
+              <a:t>.</a:t>
+            </a:r>
+          </a:p>
+          <a:p>
+            <a:pPr marL="68580" indent="0">
+              <a:buNone/>
+            </a:pPr>
+            <a:endParaRPr lang="fr-FR" dirty="0"/>
+          </a:p>
+          <a:p>
+            <a:endParaRPr lang="fr-FR" dirty="0" smtClean="0"/>
+          </a:p>
+          <a:p>
+            <a:endParaRPr lang="fr-FR" dirty="0" smtClean="0"/>
+          </a:p>
+        </p:txBody>
+      </p:sp>
+      <p:sp>
+        <p:nvSpPr>
+          <p:cNvPr id="4" name="Slide Number Placeholder 3"/>
+          <p:cNvSpPr>
+            <a:spLocks noGrp="1"/>
+          </p:cNvSpPr>
+          <p:nvPr>
+            <p:ph type="sldNum" sz="quarter" idx="12"/>
+          </p:nvPr>
+        </p:nvSpPr>
+        <p:spPr/>
+        <p:txBody>
+          <a:bodyPr/>
+          <a:lstStyle/>
+          <a:p>
+            <a:fld id="{8BAAF0B6-2BEA-4050-93E2-11DE2E69EC2C}" type="slidenum">
+              <a:rPr lang="en-US" smtClean="0"/>
+              <a:t>4</a:t>
+            </a:fld>
+            <a:endParaRPr lang="en-US" dirty="0"/>
+          </a:p>
+        </p:txBody>
+      </p:sp>
+    </p:spTree>
+    <p:extLst>
+      <p:ext uri="{BB962C8B-B14F-4D97-AF65-F5344CB8AC3E}">
+        <p14:creationId xmlns:p14="http://schemas.microsoft.com/office/powerpoint/2010/main" val="1580481872"/>
+      </p:ext>
+    </p:extLst>
+  </p:cSld>
+  <p:clrMapOvr>
+    <a:masterClrMapping/>
+  </p:clrMapOvr>
+  <p:timing>
+    <p:tnLst>
+      <p:par>
+        <p:cTn id="1" dur="indefinite" restart="never" nodeType="tmRoot"/>
+      </p:par>
+    </p:tnLst>
+  </p:timing>
+</p:sld>
+</file>
+
+<file path=ppt/slides/slide5.xml><?xml version="1.0" encoding="utf-8"?>
+<p:sld xmlns:a="http://schemas.openxmlformats.org/drawingml/2006/main" xmlns:r="http://schemas.openxmlformats.org/officeDocument/2006/relationships" xmlns:p="http://schemas.openxmlformats.org/presentationml/2006/main">
+  <p:cSld>
+    <p:spTree>
+      <p:nvGrpSpPr>
+        <p:cNvPr id="1" name=""/>
+        <p:cNvGrpSpPr/>
+        <p:nvPr/>
+      </p:nvGrpSpPr>
+      <p:grpSpPr>
+        <a:xfrm>
+          <a:off x="0" y="0"/>
+          <a:ext cx="0" cy="0"/>
+          <a:chOff x="0" y="0"/>
+          <a:chExt cx="0" cy="0"/>
+        </a:xfrm>
+      </p:grpSpPr>
+      <p:sp>
+        <p:nvSpPr>
+          <p:cNvPr id="2" name="Title 1"/>
+          <p:cNvSpPr>
+            <a:spLocks noGrp="1"/>
+          </p:cNvSpPr>
+          <p:nvPr>
+            <p:ph type="title"/>
+          </p:nvPr>
+        </p:nvSpPr>
+        <p:spPr/>
+        <p:txBody>
+          <a:bodyPr>
+            <a:normAutofit fontScale="90000"/>
+          </a:bodyPr>
+          <a:lstStyle/>
+          <a:p>
+            <a:r>
+              <a:rPr lang="fr-FR" dirty="0" smtClean="0"/>
+              <a:t>Réseaux de </a:t>
+            </a:r>
+            <a:r>
+              <a:rPr lang="fr-FR" dirty="0" smtClean="0"/>
+              <a:t>neurones manuel</a:t>
+            </a:r>
+            <a:endParaRPr lang="en-US" dirty="0"/>
+          </a:p>
+        </p:txBody>
+      </p:sp>
+      <p:sp>
+        <p:nvSpPr>
+          <p:cNvPr id="3" name="Content Placeholder 2"/>
+          <p:cNvSpPr>
+            <a:spLocks noGrp="1"/>
+          </p:cNvSpPr>
+          <p:nvPr>
+            <p:ph idx="1"/>
+          </p:nvPr>
+        </p:nvSpPr>
+        <p:spPr/>
+        <p:txBody>
+          <a:bodyPr>
+            <a:normAutofit/>
+          </a:bodyPr>
+          <a:lstStyle/>
+          <a:p>
+            <a:r>
+              <a:rPr lang="fr-FR" dirty="0" smtClean="0"/>
+              <a:t>2 couche cachées</a:t>
+            </a:r>
+          </a:p>
+          <a:p>
+            <a:r>
+              <a:rPr lang="fr-FR" dirty="0" smtClean="0"/>
+              <a:t>238 neurones </a:t>
+            </a:r>
+            <a:r>
+              <a:rPr lang="fr-FR" dirty="0" smtClean="0"/>
+              <a:t>en entrée (les case vue, la faim, et </a:t>
+            </a:r>
+            <a:r>
+              <a:rPr lang="fr-FR" dirty="0" smtClean="0"/>
+              <a:t>les 5 dernière actions</a:t>
+            </a:r>
+            <a:r>
+              <a:rPr lang="fr-FR" dirty="0" smtClean="0"/>
+              <a:t>)</a:t>
+            </a:r>
+            <a:endParaRPr lang="fr-FR" dirty="0" smtClean="0"/>
+          </a:p>
+          <a:p>
+            <a:r>
+              <a:rPr lang="fr-FR" dirty="0"/>
+              <a:t>238 </a:t>
+            </a:r>
+            <a:r>
+              <a:rPr lang="fr-FR" dirty="0" smtClean="0"/>
+              <a:t>neurones pour </a:t>
+            </a:r>
+            <a:r>
+              <a:rPr lang="fr-FR" dirty="0" smtClean="0"/>
+              <a:t>les couches cachées</a:t>
+            </a:r>
+            <a:endParaRPr lang="fr-FR" dirty="0" smtClean="0"/>
+          </a:p>
+          <a:p>
+            <a:r>
+              <a:rPr lang="fr-FR" dirty="0" smtClean="0"/>
+              <a:t>7 neurones de sortie (les actions)</a:t>
+            </a:r>
+          </a:p>
+          <a:p>
+            <a:r>
+              <a:rPr lang="fr-FR" dirty="0" smtClean="0"/>
+              <a:t>Learning rate </a:t>
+            </a:r>
+            <a:r>
+              <a:rPr lang="fr-FR" smtClean="0"/>
+              <a:t>: </a:t>
+            </a:r>
+            <a:r>
+              <a:rPr lang="fr-FR" smtClean="0"/>
+              <a:t>0.7f</a:t>
             </a:r>
             <a:endParaRPr lang="en-US" dirty="0"/>
           </a:p>
@@ -17635,7 +17705,7 @@
     </p:spTree>
     <p:extLst>
       <p:ext uri="{BB962C8B-B14F-4D97-AF65-F5344CB8AC3E}">
-        <p14:creationId xmlns:p14="http://schemas.microsoft.com/office/powerpoint/2010/main" val="1580481872"/>
+        <p14:creationId xmlns:p14="http://schemas.microsoft.com/office/powerpoint/2010/main" val="2893092146"/>
       </p:ext>
     </p:extLst>
   </p:cSld>
@@ -17682,13 +17752,13 @@
         <p:spPr/>
         <p:txBody>
           <a:bodyPr>
-            <a:normAutofit fontScale="90000"/>
+            <a:normAutofit/>
           </a:bodyPr>
           <a:lstStyle/>
           <a:p>
             <a:r>
               <a:rPr lang="fr-FR" dirty="0" smtClean="0"/>
-              <a:t>Surspécialisation vs indécision</a:t>
+              <a:t>Gene de l’environnement</a:t>
             </a:r>
             <a:endParaRPr lang="en-US" dirty="0"/>
           </a:p>
@@ -17709,35 +17779,86 @@
           <a:bodyPr/>
           <a:lstStyle/>
           <a:p>
+            <a:r>
+              <a:rPr lang="fr-FR" dirty="0" smtClean="0"/>
+              <a:t>Gene </a:t>
+            </a:r>
+            <a:r>
+              <a:rPr lang="fr-FR" dirty="0" smtClean="0"/>
+              <a:t>des réseaux de neurones.</a:t>
+            </a:r>
+          </a:p>
+          <a:p>
+            <a:pPr lvl="1"/>
+            <a:r>
+              <a:rPr lang="fr-FR" dirty="0" smtClean="0"/>
+              <a:t>Nombre </a:t>
+            </a:r>
+            <a:r>
+              <a:rPr lang="fr-FR" dirty="0" smtClean="0"/>
+              <a:t>et taille des couches cachées</a:t>
+            </a:r>
+            <a:r>
+              <a:rPr lang="fr-FR" dirty="0" smtClean="0"/>
+              <a:t>.</a:t>
+            </a:r>
+          </a:p>
+          <a:p>
+            <a:pPr lvl="1"/>
+            <a:r>
+              <a:rPr lang="fr-FR" dirty="0" smtClean="0"/>
+              <a:t>Learning </a:t>
+            </a:r>
+            <a:r>
+              <a:rPr lang="fr-FR" dirty="0" smtClean="0"/>
+              <a:t>rate et </a:t>
+            </a:r>
+            <a:r>
+              <a:rPr lang="fr-FR" dirty="0" smtClean="0"/>
+              <a:t>fonctions d’activations.</a:t>
+            </a:r>
             <a:endParaRPr lang="fr-FR" dirty="0" smtClean="0"/>
           </a:p>
           <a:p>
+            <a:pPr lvl="1"/>
             <a:r>
               <a:rPr lang="fr-FR" dirty="0" smtClean="0"/>
-              <a:t>Trouver la bonne balance entre récompense et remise en cause.</a:t>
+              <a:t>Step </a:t>
+            </a:r>
+            <a:r>
+              <a:rPr lang="fr-FR" dirty="0" smtClean="0"/>
+              <a:t>d’apprentissage </a:t>
+            </a:r>
+            <a:r>
+              <a:rPr lang="fr-FR" dirty="0" smtClean="0"/>
+              <a:t>et de </a:t>
+            </a:r>
+            <a:r>
+              <a:rPr lang="fr-FR" dirty="0" smtClean="0"/>
+              <a:t>décision.</a:t>
             </a:r>
           </a:p>
           <a:p>
-            <a:endParaRPr lang="fr-FR" dirty="0" smtClean="0"/>
-          </a:p>
-          <a:p>
-            <a:r>
-              <a:rPr lang="fr-FR" dirty="0" smtClean="0"/>
-              <a:t>Valorisation de l’entrainement variable.</a:t>
-            </a:r>
-            <a:endParaRPr lang="fr-FR" dirty="0"/>
-          </a:p>
-          <a:p>
+            <a:pPr lvl="1"/>
             <a:endParaRPr lang="fr-FR" dirty="0"/>
           </a:p>
           <a:p>
             <a:r>
-              <a:rPr lang="fr-FR" dirty="0" smtClean="0"/>
-              <a:t>Système capable de revenir a un état normal</a:t>
+              <a:rPr lang="fr-FR" dirty="0"/>
+              <a:t>Gene de l’espèces .</a:t>
             </a:r>
           </a:p>
           <a:p>
-            <a:endParaRPr lang="en-US" dirty="0"/>
+            <a:pPr lvl="1"/>
+            <a:r>
+              <a:rPr lang="fr-FR" dirty="0"/>
+              <a:t>Les poids de l’évaluation</a:t>
+            </a:r>
+            <a:r>
+              <a:rPr lang="fr-FR" dirty="0" smtClean="0"/>
+              <a:t>.</a:t>
+            </a:r>
+            <a:endParaRPr lang="fr-FR" dirty="0"/>
           </a:p>
         </p:txBody>
       </p:sp>
@@ -17818,7 +17939,7 @@
           <a:p>
             <a:r>
               <a:rPr lang="fr-FR" dirty="0" smtClean="0"/>
-              <a:t>Réseaux de neurones</a:t>
+              <a:t>L’algorithme génétiques</a:t>
             </a:r>
             <a:endParaRPr lang="en-US" dirty="0"/>
           </a:p>
@@ -17836,75 +17957,40 @@
         </p:nvSpPr>
         <p:spPr/>
         <p:txBody>
-          <a:bodyPr/>
+          <a:bodyPr>
+            <a:normAutofit/>
+          </a:bodyPr>
           <a:lstStyle/>
           <a:p>
             <a:r>
               <a:rPr lang="fr-FR" dirty="0" smtClean="0"/>
-              <a:t>2 couche cachées</a:t>
+              <a:t>20 Environnement qui tournent en parallèles pendant 30min.</a:t>
+            </a:r>
+            <a:endParaRPr lang="fr-FR" dirty="0"/>
+          </a:p>
+          <a:p>
+            <a:r>
+              <a:rPr lang="fr-FR" dirty="0" smtClean="0"/>
+              <a:t>On évalue chaque environnement, on choisie les parents proportionnellement a leurs performance.</a:t>
             </a:r>
           </a:p>
           <a:p>
             <a:r>
               <a:rPr lang="fr-FR" dirty="0" smtClean="0"/>
-              <a:t>74</a:t>
+              <a:t>On choisie le maillon faible en inversant la perf.</a:t>
             </a:r>
-            <a:r>
-              <a:rPr lang="fr-FR" dirty="0" smtClean="0"/>
-              <a:t> </a:t>
-            </a:r>
-            <a:r>
-              <a:rPr lang="fr-FR" dirty="0" smtClean="0"/>
-              <a:t>neurones en entrée (les case vue, la faim, et la précédente sortie)</a:t>
-            </a:r>
+            <a:endParaRPr lang="fr-FR" dirty="0"/>
           </a:p>
           <a:p>
             <a:r>
               <a:rPr lang="fr-FR" dirty="0" smtClean="0"/>
-              <a:t>148</a:t>
-            </a:r>
-            <a:r>
-              <a:rPr lang="fr-FR" dirty="0" smtClean="0"/>
-              <a:t> </a:t>
-            </a:r>
-            <a:r>
-              <a:rPr lang="fr-FR" dirty="0" smtClean="0"/>
-              <a:t>neurones pour la première couche caché</a:t>
+              <a:t>1 chance sur 10 d’avoir une mutation.</a:t>
             </a:r>
           </a:p>
           <a:p>
-            <a:r>
-              <a:rPr lang="fr-FR" dirty="0" smtClean="0"/>
-              <a:t>74</a:t>
-            </a:r>
-            <a:r>
-              <a:rPr lang="fr-FR" dirty="0" smtClean="0"/>
-              <a:t> </a:t>
-            </a:r>
-            <a:r>
-              <a:rPr lang="fr-FR" dirty="0" smtClean="0"/>
-              <a:t>neurones pour la deuxième.</a:t>
-            </a:r>
+            <a:endParaRPr lang="fr-FR" dirty="0" smtClean="0"/>
           </a:p>
           <a:p>
-            <a:r>
-              <a:rPr lang="fr-FR" dirty="0" smtClean="0"/>
-              <a:t>7 neurones de sortie (les actions)</a:t>
-            </a:r>
-          </a:p>
-          <a:p>
-            <a:r>
-              <a:rPr lang="fr-FR" dirty="0" smtClean="0"/>
-              <a:t>Learning rate </a:t>
-            </a:r>
-            <a:r>
-              <a:rPr lang="fr-FR" smtClean="0"/>
-              <a:t>: </a:t>
-            </a:r>
-            <a:r>
-              <a:rPr lang="fr-FR" smtClean="0"/>
-              <a:t>0.5f</a:t>
-            </a:r>
             <a:endParaRPr lang="en-US" dirty="0"/>
           </a:p>
         </p:txBody>
@@ -17935,20 +18021,13 @@
     </p:spTree>
     <p:extLst>
       <p:ext uri="{BB962C8B-B14F-4D97-AF65-F5344CB8AC3E}">
-        <p14:creationId xmlns:p14="http://schemas.microsoft.com/office/powerpoint/2010/main" val="2893092146"/>
+        <p14:creationId xmlns:p14="http://schemas.microsoft.com/office/powerpoint/2010/main" val="3949835561"/>
       </p:ext>
     </p:extLst>
   </p:cSld>
   <p:clrMapOvr>
     <a:masterClrMapping/>
   </p:clrMapOvr>
-  <p:timing>
-    <p:tnLst>
-      <p:par>
-        <p:cTn id="1" dur="indefinite" restart="never" nodeType="tmRoot"/>
-      </p:par>
-    </p:tnLst>
-  </p:timing>
 </p:sld>
 </file>
 
@@ -18009,30 +18088,22 @@
           <a:p>
             <a:r>
               <a:rPr lang="fr-FR" dirty="0" smtClean="0"/>
-              <a:t>On a un truc qui tiens la route</a:t>
+              <a:t>Il nous faut plus de processeur.</a:t>
             </a:r>
           </a:p>
           <a:p>
-            <a:endParaRPr lang="fr-FR" dirty="0"/>
+            <a:endParaRPr lang="fr-FR" dirty="0" smtClean="0"/>
           </a:p>
           <a:p>
             <a:r>
               <a:rPr lang="fr-FR" dirty="0" smtClean="0"/>
-              <a:t>Rajouter plus de persistance de la connaissance</a:t>
+              <a:t>Il nous faut plus de temps de calcul.</a:t>
             </a:r>
           </a:p>
           <a:p>
-            <a:endParaRPr lang="fr-FR" dirty="0"/>
+            <a:endParaRPr lang="fr-FR" dirty="0" smtClean="0"/>
           </a:p>
           <a:p>
-            <a:r>
-              <a:rPr lang="fr-FR" dirty="0" smtClean="0"/>
-              <a:t>Rajouter plus </a:t>
-            </a:r>
-            <a:r>
-              <a:rPr lang="fr-FR" smtClean="0"/>
-              <a:t>de règles.</a:t>
-            </a:r>
             <a:endParaRPr lang="en-US" dirty="0"/>
           </a:p>
         </p:txBody>
@@ -18077,6 +18148,144 @@
       </p:par>
     </p:tnLst>
   </p:timing>
+</p:sld>
+</file>
+
+<file path=ppt/slides/slide9.xml><?xml version="1.0" encoding="utf-8"?>
+<p:sld xmlns:a="http://schemas.openxmlformats.org/drawingml/2006/main" xmlns:r="http://schemas.openxmlformats.org/officeDocument/2006/relationships" xmlns:p="http://schemas.openxmlformats.org/presentationml/2006/main" show="0">
+  <p:cSld>
+    <p:spTree>
+      <p:nvGrpSpPr>
+        <p:cNvPr id="1" name=""/>
+        <p:cNvGrpSpPr/>
+        <p:nvPr/>
+      </p:nvGrpSpPr>
+      <p:grpSpPr>
+        <a:xfrm>
+          <a:off x="0" y="0"/>
+          <a:ext cx="0" cy="0"/>
+          <a:chOff x="0" y="0"/>
+          <a:chExt cx="0" cy="0"/>
+        </a:xfrm>
+      </p:grpSpPr>
+      <p:sp>
+        <p:nvSpPr>
+          <p:cNvPr id="2" name="Title 1"/>
+          <p:cNvSpPr>
+            <a:spLocks noGrp="1"/>
+          </p:cNvSpPr>
+          <p:nvPr>
+            <p:ph type="title"/>
+          </p:nvPr>
+        </p:nvSpPr>
+        <p:spPr/>
+        <p:txBody>
+          <a:bodyPr/>
+          <a:lstStyle/>
+          <a:p>
+            <a:r>
+              <a:rPr lang="fr-FR" dirty="0" smtClean="0"/>
+              <a:t>Environnement des l'IA</a:t>
+            </a:r>
+            <a:endParaRPr lang="en-US" dirty="0"/>
+          </a:p>
+        </p:txBody>
+      </p:sp>
+      <p:sp>
+        <p:nvSpPr>
+          <p:cNvPr id="3" name="Content Placeholder 2"/>
+          <p:cNvSpPr>
+            <a:spLocks noGrp="1"/>
+          </p:cNvSpPr>
+          <p:nvPr>
+            <p:ph idx="1"/>
+          </p:nvPr>
+        </p:nvSpPr>
+        <p:spPr/>
+        <p:txBody>
+          <a:bodyPr/>
+          <a:lstStyle/>
+          <a:p>
+            <a:r>
+              <a:rPr lang="fr-FR" dirty="0" smtClean="0"/>
+              <a:t>Partiellement Observable</a:t>
+            </a:r>
+            <a:endParaRPr lang="fr-FR" dirty="0"/>
+          </a:p>
+          <a:p>
+            <a:r>
+              <a:rPr lang="fr-FR" dirty="0" smtClean="0"/>
+              <a:t>Continue (la simulation évolue).</a:t>
+            </a:r>
+            <a:endParaRPr lang="fr-FR" dirty="0"/>
+          </a:p>
+          <a:p>
+            <a:r>
+              <a:rPr lang="fr-FR" dirty="0" smtClean="0"/>
+              <a:t>Déterministe (par de jeux de hasard).</a:t>
+            </a:r>
+          </a:p>
+          <a:p>
+            <a:r>
+              <a:rPr lang="fr-FR" dirty="0" smtClean="0"/>
+              <a:t>Discrète.</a:t>
+            </a:r>
+          </a:p>
+          <a:p>
+            <a:r>
+              <a:rPr lang="fr-FR" dirty="0" smtClean="0"/>
+              <a:t>Compétitif</a:t>
+            </a:r>
+          </a:p>
+          <a:p>
+            <a:endParaRPr lang="fr-FR" dirty="0"/>
+          </a:p>
+          <a:p>
+            <a:endParaRPr lang="en-US" dirty="0"/>
+          </a:p>
+        </p:txBody>
+      </p:sp>
+      <p:sp>
+        <p:nvSpPr>
+          <p:cNvPr id="4" name="Slide Number Placeholder 3"/>
+          <p:cNvSpPr>
+            <a:spLocks noGrp="1"/>
+          </p:cNvSpPr>
+          <p:nvPr>
+            <p:ph type="sldNum" sz="quarter" idx="12"/>
+          </p:nvPr>
+        </p:nvSpPr>
+        <p:spPr/>
+        <p:txBody>
+          <a:bodyPr/>
+          <a:lstStyle/>
+          <a:p>
+            <a:fld id="{8BAAF0B6-2BEA-4050-93E2-11DE2E69EC2C}" type="slidenum">
+              <a:rPr lang="en-US" smtClean="0"/>
+              <a:t>9</a:t>
+            </a:fld>
+            <a:endParaRPr lang="en-US" dirty="0"/>
+          </a:p>
+        </p:txBody>
+      </p:sp>
+    </p:spTree>
+    <p:extLst>
+      <p:ext uri="{BB962C8B-B14F-4D97-AF65-F5344CB8AC3E}">
+        <p14:creationId xmlns:p14="http://schemas.microsoft.com/office/powerpoint/2010/main" val="1363514379"/>
+      </p:ext>
+    </p:extLst>
+  </p:cSld>
+  <p:clrMapOvr>
+    <a:masterClrMapping/>
+  </p:clrMapOvr>
+  <mc:AlternateContent xmlns:mc="http://schemas.openxmlformats.org/markup-compatibility/2006" xmlns:p14="http://schemas.microsoft.com/office/powerpoint/2010/main">
+    <mc:Choice Requires="p14">
+      <p:transition spd="slow" p14:dur="2000"/>
+    </mc:Choice>
+    <mc:Fallback xmlns="">
+      <p:transition spd="slow"/>
+    </mc:Fallback>
+  </mc:AlternateContent>
 </p:sld>
 </file>
 

</xml_diff>

<commit_message>
Correction d'appel de fonction
</commit_message>
<xml_diff>
--- a/Pattern Matcher.pptx
+++ b/Pattern Matcher.pptx
@@ -5,18 +5,19 @@
     <p:sldMasterId id="2147483696" r:id="rId1"/>
   </p:sldMasterIdLst>
   <p:notesMasterIdLst>
-    <p:notesMasterId r:id="rId11"/>
+    <p:notesMasterId r:id="rId12"/>
   </p:notesMasterIdLst>
   <p:sldIdLst>
     <p:sldId id="256" r:id="rId2"/>
-    <p:sldId id="257" r:id="rId3"/>
-    <p:sldId id="259" r:id="rId4"/>
-    <p:sldId id="260" r:id="rId5"/>
-    <p:sldId id="262" r:id="rId6"/>
-    <p:sldId id="261" r:id="rId7"/>
-    <p:sldId id="264" r:id="rId8"/>
-    <p:sldId id="263" r:id="rId9"/>
-    <p:sldId id="258" r:id="rId10"/>
+    <p:sldId id="265" r:id="rId3"/>
+    <p:sldId id="257" r:id="rId4"/>
+    <p:sldId id="259" r:id="rId5"/>
+    <p:sldId id="260" r:id="rId6"/>
+    <p:sldId id="262" r:id="rId7"/>
+    <p:sldId id="261" r:id="rId8"/>
+    <p:sldId id="264" r:id="rId9"/>
+    <p:sldId id="263" r:id="rId10"/>
+    <p:sldId id="258" r:id="rId11"/>
   </p:sldIdLst>
   <p:sldSz cx="9144000" cy="6858000" type="screen4x3"/>
   <p:notesSz cx="6858000" cy="9144000"/>
@@ -17138,6 +17139,144 @@
 </p:sld>
 </file>
 
+<file path=ppt/slides/slide10.xml><?xml version="1.0" encoding="utf-8"?>
+<p:sld xmlns:a="http://schemas.openxmlformats.org/drawingml/2006/main" xmlns:r="http://schemas.openxmlformats.org/officeDocument/2006/relationships" xmlns:p="http://schemas.openxmlformats.org/presentationml/2006/main" show="0">
+  <p:cSld>
+    <p:spTree>
+      <p:nvGrpSpPr>
+        <p:cNvPr id="1" name=""/>
+        <p:cNvGrpSpPr/>
+        <p:nvPr/>
+      </p:nvGrpSpPr>
+      <p:grpSpPr>
+        <a:xfrm>
+          <a:off x="0" y="0"/>
+          <a:ext cx="0" cy="0"/>
+          <a:chOff x="0" y="0"/>
+          <a:chExt cx="0" cy="0"/>
+        </a:xfrm>
+      </p:grpSpPr>
+      <p:sp>
+        <p:nvSpPr>
+          <p:cNvPr id="2" name="Title 1"/>
+          <p:cNvSpPr>
+            <a:spLocks noGrp="1"/>
+          </p:cNvSpPr>
+          <p:nvPr>
+            <p:ph type="title"/>
+          </p:nvPr>
+        </p:nvSpPr>
+        <p:spPr/>
+        <p:txBody>
+          <a:bodyPr/>
+          <a:lstStyle/>
+          <a:p>
+            <a:r>
+              <a:rPr lang="fr-FR" dirty="0" smtClean="0"/>
+              <a:t>Environnement des l'IA</a:t>
+            </a:r>
+            <a:endParaRPr lang="en-US" dirty="0"/>
+          </a:p>
+        </p:txBody>
+      </p:sp>
+      <p:sp>
+        <p:nvSpPr>
+          <p:cNvPr id="3" name="Content Placeholder 2"/>
+          <p:cNvSpPr>
+            <a:spLocks noGrp="1"/>
+          </p:cNvSpPr>
+          <p:nvPr>
+            <p:ph idx="1"/>
+          </p:nvPr>
+        </p:nvSpPr>
+        <p:spPr/>
+        <p:txBody>
+          <a:bodyPr/>
+          <a:lstStyle/>
+          <a:p>
+            <a:r>
+              <a:rPr lang="fr-FR" dirty="0" smtClean="0"/>
+              <a:t>Partiellement Observable</a:t>
+            </a:r>
+            <a:endParaRPr lang="fr-FR" dirty="0"/>
+          </a:p>
+          <a:p>
+            <a:r>
+              <a:rPr lang="fr-FR" dirty="0" smtClean="0"/>
+              <a:t>Continue (la simulation évolue).</a:t>
+            </a:r>
+            <a:endParaRPr lang="fr-FR" dirty="0"/>
+          </a:p>
+          <a:p>
+            <a:r>
+              <a:rPr lang="fr-FR" dirty="0" smtClean="0"/>
+              <a:t>Déterministe (par de jeux de hasard).</a:t>
+            </a:r>
+          </a:p>
+          <a:p>
+            <a:r>
+              <a:rPr lang="fr-FR" dirty="0" smtClean="0"/>
+              <a:t>Discrète.</a:t>
+            </a:r>
+          </a:p>
+          <a:p>
+            <a:r>
+              <a:rPr lang="fr-FR" dirty="0" smtClean="0"/>
+              <a:t>Compétitif</a:t>
+            </a:r>
+          </a:p>
+          <a:p>
+            <a:endParaRPr lang="fr-FR" dirty="0"/>
+          </a:p>
+          <a:p>
+            <a:endParaRPr lang="en-US" dirty="0"/>
+          </a:p>
+        </p:txBody>
+      </p:sp>
+      <p:sp>
+        <p:nvSpPr>
+          <p:cNvPr id="4" name="Slide Number Placeholder 3"/>
+          <p:cNvSpPr>
+            <a:spLocks noGrp="1"/>
+          </p:cNvSpPr>
+          <p:nvPr>
+            <p:ph type="sldNum" sz="quarter" idx="12"/>
+          </p:nvPr>
+        </p:nvSpPr>
+        <p:spPr/>
+        <p:txBody>
+          <a:bodyPr/>
+          <a:lstStyle/>
+          <a:p>
+            <a:fld id="{8BAAF0B6-2BEA-4050-93E2-11DE2E69EC2C}" type="slidenum">
+              <a:rPr lang="en-US" smtClean="0"/>
+              <a:t>10</a:t>
+            </a:fld>
+            <a:endParaRPr lang="en-US" dirty="0"/>
+          </a:p>
+        </p:txBody>
+      </p:sp>
+    </p:spTree>
+    <p:extLst>
+      <p:ext uri="{BB962C8B-B14F-4D97-AF65-F5344CB8AC3E}">
+        <p14:creationId xmlns:p14="http://schemas.microsoft.com/office/powerpoint/2010/main" val="1363514379"/>
+      </p:ext>
+    </p:extLst>
+  </p:cSld>
+  <p:clrMapOvr>
+    <a:masterClrMapping/>
+  </p:clrMapOvr>
+  <mc:AlternateContent xmlns:mc="http://schemas.openxmlformats.org/markup-compatibility/2006" xmlns:p14="http://schemas.microsoft.com/office/powerpoint/2010/main">
+    <mc:Choice Requires="p14">
+      <p:transition spd="slow" p14:dur="2000"/>
+    </mc:Choice>
+    <mc:Fallback xmlns="">
+      <p:transition spd="slow"/>
+    </mc:Fallback>
+  </mc:AlternateContent>
+</p:sld>
+</file>
+
 <file path=ppt/slides/slide2.xml><?xml version="1.0" encoding="utf-8"?>
 <p:sld xmlns:a="http://schemas.openxmlformats.org/drawingml/2006/main" xmlns:r="http://schemas.openxmlformats.org/officeDocument/2006/relationships" xmlns:p="http://schemas.openxmlformats.org/presentationml/2006/main">
   <p:cSld>
@@ -17172,6 +17311,123 @@
           <a:p>
             <a:r>
               <a:rPr lang="fr-FR" dirty="0" smtClean="0"/>
+              <a:t>Sommaire</a:t>
+            </a:r>
+            <a:endParaRPr lang="en-US" dirty="0"/>
+          </a:p>
+        </p:txBody>
+      </p:sp>
+      <p:sp>
+        <p:nvSpPr>
+          <p:cNvPr id="3" name="Content Placeholder 2"/>
+          <p:cNvSpPr>
+            <a:spLocks noGrp="1"/>
+          </p:cNvSpPr>
+          <p:nvPr>
+            <p:ph idx="1"/>
+          </p:nvPr>
+        </p:nvSpPr>
+        <p:spPr/>
+        <p:txBody>
+          <a:bodyPr/>
+          <a:lstStyle/>
+          <a:p>
+            <a:r>
+              <a:rPr lang="fr-FR" dirty="0" smtClean="0"/>
+              <a:t>Rappel du projet</a:t>
+            </a:r>
+          </a:p>
+          <a:p>
+            <a:endParaRPr lang="fr-FR" dirty="0"/>
+          </a:p>
+          <a:p>
+            <a:r>
+              <a:rPr lang="fr-FR" dirty="0" smtClean="0"/>
+              <a:t>Présentation du réseau de neurone initial</a:t>
+            </a:r>
+          </a:p>
+          <a:p>
+            <a:endParaRPr lang="fr-FR" dirty="0"/>
+          </a:p>
+          <a:p>
+            <a:r>
+              <a:rPr lang="fr-FR" dirty="0" smtClean="0"/>
+              <a:t>Présentation de l’implémentation de la génétique.</a:t>
+            </a:r>
+            <a:endParaRPr lang="en-US" dirty="0"/>
+          </a:p>
+        </p:txBody>
+      </p:sp>
+      <p:sp>
+        <p:nvSpPr>
+          <p:cNvPr id="4" name="Slide Number Placeholder 3"/>
+          <p:cNvSpPr>
+            <a:spLocks noGrp="1"/>
+          </p:cNvSpPr>
+          <p:nvPr>
+            <p:ph type="sldNum" sz="quarter" idx="12"/>
+          </p:nvPr>
+        </p:nvSpPr>
+        <p:spPr/>
+        <p:txBody>
+          <a:bodyPr/>
+          <a:lstStyle/>
+          <a:p>
+            <a:fld id="{8BAAF0B6-2BEA-4050-93E2-11DE2E69EC2C}" type="slidenum">
+              <a:rPr lang="en-US" smtClean="0"/>
+              <a:t>2</a:t>
+            </a:fld>
+            <a:endParaRPr lang="en-US" dirty="0"/>
+          </a:p>
+        </p:txBody>
+      </p:sp>
+    </p:spTree>
+    <p:extLst>
+      <p:ext uri="{BB962C8B-B14F-4D97-AF65-F5344CB8AC3E}">
+        <p14:creationId xmlns:p14="http://schemas.microsoft.com/office/powerpoint/2010/main" val="4158897493"/>
+      </p:ext>
+    </p:extLst>
+  </p:cSld>
+  <p:clrMapOvr>
+    <a:masterClrMapping/>
+  </p:clrMapOvr>
+</p:sld>
+</file>
+
+<file path=ppt/slides/slide3.xml><?xml version="1.0" encoding="utf-8"?>
+<p:sld xmlns:a="http://schemas.openxmlformats.org/drawingml/2006/main" xmlns:r="http://schemas.openxmlformats.org/officeDocument/2006/relationships" xmlns:p="http://schemas.openxmlformats.org/presentationml/2006/main">
+  <p:cSld>
+    <p:spTree>
+      <p:nvGrpSpPr>
+        <p:cNvPr id="1" name=""/>
+        <p:cNvGrpSpPr/>
+        <p:nvPr/>
+      </p:nvGrpSpPr>
+      <p:grpSpPr>
+        <a:xfrm>
+          <a:off x="0" y="0"/>
+          <a:ext cx="0" cy="0"/>
+          <a:chOff x="0" y="0"/>
+          <a:chExt cx="0" cy="0"/>
+        </a:xfrm>
+      </p:grpSpPr>
+      <p:sp>
+        <p:nvSpPr>
+          <p:cNvPr id="2" name="Title 1"/>
+          <p:cNvSpPr>
+            <a:spLocks noGrp="1"/>
+          </p:cNvSpPr>
+          <p:nvPr>
+            <p:ph type="title"/>
+          </p:nvPr>
+        </p:nvSpPr>
+        <p:spPr/>
+        <p:txBody>
+          <a:bodyPr/>
+          <a:lstStyle/>
+          <a:p>
+            <a:r>
+              <a:rPr lang="fr-FR" dirty="0" smtClean="0"/>
               <a:t>Le jeux</a:t>
             </a:r>
             <a:endParaRPr lang="en-US" dirty="0"/>
@@ -17235,12 +17491,12 @@
               <a:t>Une seule </a:t>
             </a:r>
             <a:r>
-              <a:rPr lang="fr-FR" dirty="0" err="1" smtClean="0"/>
-              <a:t>ia</a:t>
+              <a:rPr lang="fr-FR" dirty="0" smtClean="0"/>
+              <a:t>IA </a:t>
             </a:r>
             <a:r>
               <a:rPr lang="fr-FR" dirty="0" smtClean="0"/>
-              <a:t> par espèce.</a:t>
+              <a:t>par espèce.</a:t>
             </a:r>
             <a:endParaRPr lang="fr-FR" dirty="0"/>
           </a:p>
@@ -17263,7 +17519,7 @@
           <a:p>
             <a:fld id="{8BAAF0B6-2BEA-4050-93E2-11DE2E69EC2C}" type="slidenum">
               <a:rPr lang="en-US" smtClean="0"/>
-              <a:t>2</a:t>
+              <a:t>3</a:t>
             </a:fld>
             <a:endParaRPr lang="en-US" dirty="0"/>
           </a:p>
@@ -17289,7 +17545,7 @@
 </p:sld>
 </file>
 
-<file path=ppt/slides/slide3.xml><?xml version="1.0" encoding="utf-8"?>
+<file path=ppt/slides/slide4.xml><?xml version="1.0" encoding="utf-8"?>
 <p:sld xmlns:a="http://schemas.openxmlformats.org/drawingml/2006/main" xmlns:r="http://schemas.openxmlformats.org/officeDocument/2006/relationships" xmlns:p="http://schemas.openxmlformats.org/presentationml/2006/main">
   <p:cSld>
     <p:spTree>
@@ -17371,7 +17627,7 @@
           <a:p>
             <a:fld id="{8BAAF0B6-2BEA-4050-93E2-11DE2E69EC2C}" type="slidenum">
               <a:rPr lang="en-US" smtClean="0"/>
-              <a:t>3</a:t>
+              <a:t>4</a:t>
             </a:fld>
             <a:endParaRPr lang="en-US" dirty="0"/>
           </a:p>
@@ -17387,170 +17643,6 @@
   <p:clrMapOvr>
     <a:masterClrMapping/>
   </p:clrMapOvr>
-</p:sld>
-</file>
-
-<file path=ppt/slides/slide4.xml><?xml version="1.0" encoding="utf-8"?>
-<p:sld xmlns:a="http://schemas.openxmlformats.org/drawingml/2006/main" xmlns:r="http://schemas.openxmlformats.org/officeDocument/2006/relationships" xmlns:p="http://schemas.openxmlformats.org/presentationml/2006/main">
-  <p:cSld>
-    <p:spTree>
-      <p:nvGrpSpPr>
-        <p:cNvPr id="1" name=""/>
-        <p:cNvGrpSpPr/>
-        <p:nvPr/>
-      </p:nvGrpSpPr>
-      <p:grpSpPr>
-        <a:xfrm>
-          <a:off x="0" y="0"/>
-          <a:ext cx="0" cy="0"/>
-          <a:chOff x="0" y="0"/>
-          <a:chExt cx="0" cy="0"/>
-        </a:xfrm>
-      </p:grpSpPr>
-      <p:sp>
-        <p:nvSpPr>
-          <p:cNvPr id="2" name="Title 1"/>
-          <p:cNvSpPr>
-            <a:spLocks noGrp="1"/>
-          </p:cNvSpPr>
-          <p:nvPr>
-            <p:ph type="title"/>
-          </p:nvPr>
-        </p:nvSpPr>
-        <p:spPr/>
-        <p:txBody>
-          <a:bodyPr/>
-          <a:lstStyle/>
-          <a:p>
-            <a:r>
-              <a:rPr lang="fr-FR" dirty="0" smtClean="0"/>
-              <a:t>Les changements</a:t>
-            </a:r>
-            <a:endParaRPr lang="en-US" dirty="0"/>
-          </a:p>
-        </p:txBody>
-      </p:sp>
-      <p:sp>
-        <p:nvSpPr>
-          <p:cNvPr id="3" name="Content Placeholder 2"/>
-          <p:cNvSpPr>
-            <a:spLocks noGrp="1"/>
-          </p:cNvSpPr>
-          <p:nvPr>
-            <p:ph idx="1"/>
-          </p:nvPr>
-        </p:nvSpPr>
-        <p:spPr/>
-        <p:txBody>
-          <a:bodyPr>
-            <a:normAutofit/>
-          </a:bodyPr>
-          <a:lstStyle/>
-          <a:p>
-            <a:r>
-              <a:rPr lang="fr-FR" dirty="0" smtClean="0"/>
-              <a:t>Une partie du moteur logique refait.</a:t>
-            </a:r>
-            <a:endParaRPr lang="fr-FR" dirty="0"/>
-          </a:p>
-          <a:p>
-            <a:r>
-              <a:rPr lang="fr-FR" dirty="0" smtClean="0"/>
-              <a:t>Grosse optimisation</a:t>
-            </a:r>
-            <a:endParaRPr lang="fr-FR" dirty="0"/>
-          </a:p>
-          <a:p>
-            <a:r>
-              <a:rPr lang="fr-FR" dirty="0" smtClean="0"/>
-              <a:t>Réécriture de la pousse de l’herbe.</a:t>
-            </a:r>
-          </a:p>
-          <a:p>
-            <a:r>
-              <a:rPr lang="fr-FR" dirty="0" smtClean="0"/>
-              <a:t>Le réseau de neurone prend maintenant les 5 actions précédentes</a:t>
-            </a:r>
-          </a:p>
-          <a:p>
-            <a:endParaRPr lang="fr-FR" dirty="0" smtClean="0"/>
-          </a:p>
-          <a:p>
-            <a:r>
-              <a:rPr lang="fr-FR" dirty="0" smtClean="0"/>
-              <a:t>La mise en place de l’</a:t>
-            </a:r>
-            <a:r>
-              <a:rPr lang="fr-FR" dirty="0" err="1" smtClean="0"/>
-              <a:t>algo</a:t>
-            </a:r>
-            <a:r>
-              <a:rPr lang="fr-FR" dirty="0" smtClean="0"/>
-              <a:t> </a:t>
-            </a:r>
-            <a:r>
-              <a:rPr lang="fr-FR" dirty="0" err="1" smtClean="0"/>
-              <a:t>gen</a:t>
-            </a:r>
-            <a:r>
-              <a:rPr lang="fr-FR" dirty="0" smtClean="0"/>
-              <a:t>.</a:t>
-            </a:r>
-          </a:p>
-          <a:p>
-            <a:pPr marL="68580" indent="0">
-              <a:buNone/>
-            </a:pPr>
-            <a:endParaRPr lang="fr-FR" dirty="0"/>
-          </a:p>
-          <a:p>
-            <a:endParaRPr lang="fr-FR" dirty="0" smtClean="0"/>
-          </a:p>
-          <a:p>
-            <a:endParaRPr lang="fr-FR" dirty="0" smtClean="0"/>
-          </a:p>
-        </p:txBody>
-      </p:sp>
-      <p:sp>
-        <p:nvSpPr>
-          <p:cNvPr id="4" name="Slide Number Placeholder 3"/>
-          <p:cNvSpPr>
-            <a:spLocks noGrp="1"/>
-          </p:cNvSpPr>
-          <p:nvPr>
-            <p:ph type="sldNum" sz="quarter" idx="12"/>
-          </p:nvPr>
-        </p:nvSpPr>
-        <p:spPr/>
-        <p:txBody>
-          <a:bodyPr/>
-          <a:lstStyle/>
-          <a:p>
-            <a:fld id="{8BAAF0B6-2BEA-4050-93E2-11DE2E69EC2C}" type="slidenum">
-              <a:rPr lang="en-US" smtClean="0"/>
-              <a:t>4</a:t>
-            </a:fld>
-            <a:endParaRPr lang="en-US" dirty="0"/>
-          </a:p>
-        </p:txBody>
-      </p:sp>
-    </p:spTree>
-    <p:extLst>
-      <p:ext uri="{BB962C8B-B14F-4D97-AF65-F5344CB8AC3E}">
-        <p14:creationId xmlns:p14="http://schemas.microsoft.com/office/powerpoint/2010/main" val="1580481872"/>
-      </p:ext>
-    </p:extLst>
-  </p:cSld>
-  <p:clrMapOvr>
-    <a:masterClrMapping/>
-  </p:clrMapOvr>
-  <p:timing>
-    <p:tnLst>
-      <p:par>
-        <p:cTn id="1" dur="indefinite" restart="never" nodeType="tmRoot"/>
-      </p:par>
-    </p:tnLst>
-  </p:timing>
 </p:sld>
 </file>
 
@@ -17583,18 +17675,12 @@
         </p:nvSpPr>
         <p:spPr/>
         <p:txBody>
-          <a:bodyPr>
-            <a:normAutofit fontScale="90000"/>
-          </a:bodyPr>
+          <a:bodyPr/>
           <a:lstStyle/>
           <a:p>
             <a:r>
               <a:rPr lang="fr-FR" dirty="0" smtClean="0"/>
-              <a:t>Réseaux de </a:t>
-            </a:r>
-            <a:r>
-              <a:rPr lang="fr-FR" dirty="0" smtClean="0"/>
-              <a:t>neurones manuel</a:t>
+              <a:t>Les changements</a:t>
             </a:r>
             <a:endParaRPr lang="en-US" dirty="0"/>
           </a:p>
@@ -17619,63 +17705,72 @@
           <a:p>
             <a:r>
               <a:rPr lang="fr-FR" dirty="0" smtClean="0"/>
-              <a:t>2 couche cachées</a:t>
-            </a:r>
-          </a:p>
-          <a:p>
-            <a:r>
-              <a:rPr lang="fr-FR" dirty="0" smtClean="0"/>
-              <a:t>238 neurones </a:t>
+              <a:t>Une partie du moteur logique </a:t>
             </a:r>
             <a:r>
               <a:rPr lang="fr-FR" dirty="0" smtClean="0"/>
-              <a:t>en entrée (les case vue, la faim, et </a:t>
+              <a:t>refait</a:t>
+            </a:r>
+            <a:endParaRPr lang="fr-FR" dirty="0"/>
+          </a:p>
+          <a:p>
+            <a:r>
+              <a:rPr lang="fr-FR" dirty="0" smtClean="0"/>
+              <a:t>Grosse </a:t>
             </a:r>
             <a:r>
               <a:rPr lang="fr-FR" dirty="0" smtClean="0"/>
-              <a:t>les 5 dernière actions</a:t>
+              <a:t>optimisation</a:t>
+            </a:r>
+            <a:endParaRPr lang="fr-FR" dirty="0"/>
+          </a:p>
+          <a:p>
+            <a:r>
+              <a:rPr lang="fr-FR" dirty="0" smtClean="0"/>
+              <a:t>Réécriture de la pousse de </a:t>
             </a:r>
             <a:r>
               <a:rPr lang="fr-FR" dirty="0" smtClean="0"/>
-              <a:t>)</a:t>
+              <a:t>l’herbe</a:t>
             </a:r>
             <a:endParaRPr lang="fr-FR" dirty="0" smtClean="0"/>
           </a:p>
           <a:p>
             <a:r>
-              <a:rPr lang="fr-FR" dirty="0"/>
-              <a:t>238 </a:t>
+              <a:rPr lang="fr-FR" dirty="0" smtClean="0"/>
+              <a:t>Le réseau de neurone prend maintenant les 5 actions </a:t>
             </a:r>
             <a:r>
               <a:rPr lang="fr-FR" dirty="0" smtClean="0"/>
-              <a:t>neurones pour </a:t>
+              <a:t>précédentes</a:t>
             </a:r>
+            <a:endParaRPr lang="fr-FR" dirty="0" smtClean="0"/>
+          </a:p>
+          <a:p>
+            <a:endParaRPr lang="fr-FR" dirty="0" smtClean="0"/>
+          </a:p>
+          <a:p>
             <a:r>
               <a:rPr lang="fr-FR" dirty="0" smtClean="0"/>
-              <a:t>les couches cachées</a:t>
-            </a:r>
-            <a:endParaRPr lang="fr-FR" dirty="0" smtClean="0"/>
-          </a:p>
-          <a:p>
-            <a:r>
-              <a:rPr lang="fr-FR" dirty="0" smtClean="0"/>
-              <a:t>7 neurones de sortie (les actions)</a:t>
-            </a:r>
-          </a:p>
-          <a:p>
-            <a:r>
-              <a:rPr lang="fr-FR" dirty="0" smtClean="0"/>
-              <a:t>Learning rate </a:t>
+              <a:t>La mise en place de </a:t>
             </a:r>
             <a:r>
               <a:rPr lang="fr-FR" smtClean="0"/>
-              <a:t>: </a:t>
+              <a:t>la génétiques</a:t>
             </a:r>
-            <a:r>
-              <a:rPr lang="fr-FR" smtClean="0"/>
-              <a:t>0.7f</a:t>
-            </a:r>
-            <a:endParaRPr lang="en-US" dirty="0"/>
+            <a:endParaRPr lang="fr-FR" dirty="0" smtClean="0"/>
+          </a:p>
+          <a:p>
+            <a:pPr marL="68580" indent="0">
+              <a:buNone/>
+            </a:pPr>
+            <a:endParaRPr lang="fr-FR" dirty="0"/>
+          </a:p>
+          <a:p>
+            <a:endParaRPr lang="fr-FR" dirty="0" smtClean="0"/>
+          </a:p>
+          <a:p>
+            <a:endParaRPr lang="fr-FR" dirty="0" smtClean="0"/>
           </a:p>
         </p:txBody>
       </p:sp>
@@ -17705,7 +17800,7 @@
     </p:spTree>
     <p:extLst>
       <p:ext uri="{BB962C8B-B14F-4D97-AF65-F5344CB8AC3E}">
-        <p14:creationId xmlns:p14="http://schemas.microsoft.com/office/powerpoint/2010/main" val="2893092146"/>
+        <p14:creationId xmlns:p14="http://schemas.microsoft.com/office/powerpoint/2010/main" val="1580481872"/>
       </p:ext>
     </p:extLst>
   </p:cSld>
@@ -17752,13 +17847,17 @@
         <p:spPr/>
         <p:txBody>
           <a:bodyPr>
-            <a:normAutofit/>
+            <a:normAutofit fontScale="90000"/>
           </a:bodyPr>
           <a:lstStyle/>
           <a:p>
             <a:r>
               <a:rPr lang="fr-FR" dirty="0" smtClean="0"/>
-              <a:t>Gene de l’environnement</a:t>
+              <a:t>Réseaux de </a:t>
+            </a:r>
+            <a:r>
+              <a:rPr lang="fr-FR" dirty="0" smtClean="0"/>
+              <a:t>neurones manuel</a:t>
             </a:r>
             <a:endParaRPr lang="en-US" dirty="0"/>
           </a:p>
@@ -17776,89 +17875,94 @@
         </p:nvSpPr>
         <p:spPr/>
         <p:txBody>
-          <a:bodyPr/>
+          <a:bodyPr>
+            <a:normAutofit/>
+          </a:bodyPr>
           <a:lstStyle/>
           <a:p>
             <a:r>
               <a:rPr lang="fr-FR" dirty="0" smtClean="0"/>
-              <a:t>Gene </a:t>
+              <a:t>2 couche </a:t>
             </a:r>
             <a:r>
               <a:rPr lang="fr-FR" dirty="0" smtClean="0"/>
-              <a:t>des réseaux de neurones.</a:t>
+              <a:t>cachées</a:t>
             </a:r>
-          </a:p>
-          <a:p>
-            <a:pPr lvl="1"/>
+            <a:endParaRPr lang="fr-FR" dirty="0" smtClean="0"/>
+          </a:p>
+          <a:p>
             <a:r>
               <a:rPr lang="fr-FR" dirty="0" smtClean="0"/>
-              <a:t>Nombre </a:t>
+              <a:t>238 neurones </a:t>
             </a:r>
             <a:r>
               <a:rPr lang="fr-FR" dirty="0" smtClean="0"/>
-              <a:t>et taille des couches cachées</a:t>
+              <a:t>en entrée (les case vue, la faim, et </a:t>
             </a:r>
             <a:r>
               <a:rPr lang="fr-FR" dirty="0" smtClean="0"/>
-              <a:t>.</a:t>
-            </a:r>
-          </a:p>
-          <a:p>
-            <a:pPr lvl="1"/>
-            <a:r>
-              <a:rPr lang="fr-FR" dirty="0" smtClean="0"/>
-              <a:t>Learning </a:t>
+              <a:t>les 5 dernière actions</a:t>
             </a:r>
             <a:r>
               <a:rPr lang="fr-FR" dirty="0" smtClean="0"/>
-              <a:t>rate et </a:t>
+              <a:t>)</a:t>
+            </a:r>
+            <a:endParaRPr lang="fr-FR" dirty="0" smtClean="0"/>
+          </a:p>
+          <a:p>
+            <a:r>
+              <a:rPr lang="fr-FR" dirty="0"/>
+              <a:t>238 </a:t>
             </a:r>
             <a:r>
               <a:rPr lang="fr-FR" dirty="0" smtClean="0"/>
-              <a:t>fonctions d’activations.</a:t>
-            </a:r>
-            <a:endParaRPr lang="fr-FR" dirty="0" smtClean="0"/>
-          </a:p>
-          <a:p>
-            <a:pPr lvl="1"/>
-            <a:r>
-              <a:rPr lang="fr-FR" dirty="0" smtClean="0"/>
-              <a:t>Step </a:t>
+              <a:t>neurones pour </a:t>
             </a:r>
             <a:r>
               <a:rPr lang="fr-FR" dirty="0" smtClean="0"/>
-              <a:t>d’apprentissage </a:t>
+              <a:t>les couches cachées</a:t>
+            </a:r>
+            <a:endParaRPr lang="fr-FR" dirty="0" smtClean="0"/>
+          </a:p>
+          <a:p>
+            <a:r>
+              <a:rPr lang="fr-FR" dirty="0" smtClean="0"/>
+              <a:t>7 neurones de sortie (les actions</a:t>
             </a:r>
             <a:r>
               <a:rPr lang="fr-FR" dirty="0" smtClean="0"/>
-              <a:t>et de </a:t>
+              <a:t>)</a:t>
+            </a:r>
+            <a:endParaRPr lang="fr-FR" dirty="0" smtClean="0"/>
+          </a:p>
+          <a:p>
+            <a:r>
+              <a:rPr lang="fr-FR" dirty="0" smtClean="0"/>
+              <a:t>Learning rate : </a:t>
             </a:r>
             <a:r>
               <a:rPr lang="fr-FR" dirty="0" smtClean="0"/>
-              <a:t>décision.</a:t>
+              <a:t>0.7f</a:t>
             </a:r>
           </a:p>
           <a:p>
-            <a:pPr lvl="1"/>
-            <a:endParaRPr lang="fr-FR" dirty="0"/>
-          </a:p>
-          <a:p>
             <a:r>
-              <a:rPr lang="fr-FR" dirty="0"/>
-              <a:t>Gene de l’espèces .</a:t>
+              <a:rPr lang="fr-FR" dirty="0" smtClean="0"/>
+              <a:t>Fonction d’activation: </a:t>
             </a:r>
-          </a:p>
-          <a:p>
-            <a:pPr lvl="1"/>
             <a:r>
-              <a:rPr lang="fr-FR" dirty="0"/>
-              <a:t>Les poids de l’évaluation</a:t>
+              <a:rPr lang="fr-FR" dirty="0" err="1" smtClean="0"/>
+              <a:t>Gaussian</a:t>
             </a:r>
             <a:r>
               <a:rPr lang="fr-FR" dirty="0" smtClean="0"/>
-              <a:t>.</a:t>
+              <a:t> </a:t>
             </a:r>
-            <a:endParaRPr lang="fr-FR" dirty="0"/>
+            <a:r>
+              <a:rPr lang="fr-FR" dirty="0" err="1" smtClean="0"/>
+              <a:t>stepwise</a:t>
+            </a:r>
+            <a:endParaRPr lang="en-US" dirty="0"/>
           </a:p>
         </p:txBody>
       </p:sp>
@@ -17888,7 +17992,7 @@
     </p:spTree>
     <p:extLst>
       <p:ext uri="{BB962C8B-B14F-4D97-AF65-F5344CB8AC3E}">
-        <p14:creationId xmlns:p14="http://schemas.microsoft.com/office/powerpoint/2010/main" val="246561539"/>
+        <p14:creationId xmlns:p14="http://schemas.microsoft.com/office/powerpoint/2010/main" val="2893092146"/>
       </p:ext>
     </p:extLst>
   </p:cSld>
@@ -17934,12 +18038,14 @@
         </p:nvSpPr>
         <p:spPr/>
         <p:txBody>
-          <a:bodyPr/>
+          <a:bodyPr>
+            <a:normAutofit/>
+          </a:bodyPr>
           <a:lstStyle/>
           <a:p>
             <a:r>
               <a:rPr lang="fr-FR" dirty="0" smtClean="0"/>
-              <a:t>L’algorithme génétiques</a:t>
+              <a:t>Gene de l’environnement</a:t>
             </a:r>
             <a:endParaRPr lang="en-US" dirty="0"/>
           </a:p>
@@ -17957,41 +18063,89 @@
         </p:nvSpPr>
         <p:spPr/>
         <p:txBody>
-          <a:bodyPr>
-            <a:normAutofit/>
-          </a:bodyPr>
+          <a:bodyPr/>
           <a:lstStyle/>
           <a:p>
             <a:r>
               <a:rPr lang="fr-FR" dirty="0" smtClean="0"/>
-              <a:t>20 Environnement qui tournent en parallèles pendant 30min.</a:t>
+              <a:t>Gene </a:t>
+            </a:r>
+            <a:r>
+              <a:rPr lang="fr-FR" dirty="0" smtClean="0"/>
+              <a:t>des réseaux de neurones.</a:t>
+            </a:r>
+          </a:p>
+          <a:p>
+            <a:pPr lvl="1"/>
+            <a:r>
+              <a:rPr lang="fr-FR" dirty="0" smtClean="0"/>
+              <a:t>Nombre </a:t>
+            </a:r>
+            <a:r>
+              <a:rPr lang="fr-FR" dirty="0" smtClean="0"/>
+              <a:t>et taille des couches cachées</a:t>
+            </a:r>
+            <a:r>
+              <a:rPr lang="fr-FR" dirty="0" smtClean="0"/>
+              <a:t>.</a:t>
+            </a:r>
+          </a:p>
+          <a:p>
+            <a:pPr lvl="1"/>
+            <a:r>
+              <a:rPr lang="fr-FR" dirty="0" smtClean="0"/>
+              <a:t>Learning </a:t>
+            </a:r>
+            <a:r>
+              <a:rPr lang="fr-FR" dirty="0" smtClean="0"/>
+              <a:t>rate et </a:t>
+            </a:r>
+            <a:r>
+              <a:rPr lang="fr-FR" dirty="0" smtClean="0"/>
+              <a:t>fonctions d’activations.</a:t>
+            </a:r>
+            <a:endParaRPr lang="fr-FR" dirty="0" smtClean="0"/>
+          </a:p>
+          <a:p>
+            <a:pPr lvl="1"/>
+            <a:r>
+              <a:rPr lang="fr-FR" dirty="0" smtClean="0"/>
+              <a:t>Step </a:t>
+            </a:r>
+            <a:r>
+              <a:rPr lang="fr-FR" dirty="0" smtClean="0"/>
+              <a:t>d’apprentissage </a:t>
+            </a:r>
+            <a:r>
+              <a:rPr lang="fr-FR" dirty="0" smtClean="0"/>
+              <a:t>et de </a:t>
+            </a:r>
+            <a:r>
+              <a:rPr lang="fr-FR" dirty="0" smtClean="0"/>
+              <a:t>décision.</a:t>
+            </a:r>
+          </a:p>
+          <a:p>
+            <a:pPr lvl="1"/>
+            <a:endParaRPr lang="fr-FR" dirty="0"/>
+          </a:p>
+          <a:p>
+            <a:r>
+              <a:rPr lang="fr-FR" dirty="0"/>
+              <a:t>Gene de l’espèces .</a:t>
+            </a:r>
+          </a:p>
+          <a:p>
+            <a:pPr lvl="1"/>
+            <a:r>
+              <a:rPr lang="fr-FR" dirty="0"/>
+              <a:t>Les poids de l’évaluation</a:t>
+            </a:r>
+            <a:r>
+              <a:rPr lang="fr-FR" dirty="0" smtClean="0"/>
+              <a:t>.</a:t>
             </a:r>
             <a:endParaRPr lang="fr-FR" dirty="0"/>
-          </a:p>
-          <a:p>
-            <a:r>
-              <a:rPr lang="fr-FR" dirty="0" smtClean="0"/>
-              <a:t>On évalue chaque environnement, on choisie les parents proportionnellement a leurs performance.</a:t>
-            </a:r>
-          </a:p>
-          <a:p>
-            <a:r>
-              <a:rPr lang="fr-FR" dirty="0" smtClean="0"/>
-              <a:t>On choisie le maillon faible en inversant la perf.</a:t>
-            </a:r>
-            <a:endParaRPr lang="fr-FR" dirty="0"/>
-          </a:p>
-          <a:p>
-            <a:r>
-              <a:rPr lang="fr-FR" dirty="0" smtClean="0"/>
-              <a:t>1 chance sur 10 d’avoir une mutation.</a:t>
-            </a:r>
-          </a:p>
-          <a:p>
-            <a:endParaRPr lang="fr-FR" dirty="0" smtClean="0"/>
-          </a:p>
-          <a:p>
-            <a:endParaRPr lang="en-US" dirty="0"/>
           </a:p>
         </p:txBody>
       </p:sp>
@@ -18021,13 +18175,20 @@
     </p:spTree>
     <p:extLst>
       <p:ext uri="{BB962C8B-B14F-4D97-AF65-F5344CB8AC3E}">
-        <p14:creationId xmlns:p14="http://schemas.microsoft.com/office/powerpoint/2010/main" val="3949835561"/>
+        <p14:creationId xmlns:p14="http://schemas.microsoft.com/office/powerpoint/2010/main" val="246561539"/>
       </p:ext>
     </p:extLst>
   </p:cSld>
   <p:clrMapOvr>
     <a:masterClrMapping/>
   </p:clrMapOvr>
+  <p:timing>
+    <p:tnLst>
+      <p:par>
+        <p:cTn id="1" dur="indefinite" restart="never" nodeType="tmRoot"/>
+      </p:par>
+    </p:tnLst>
+  </p:timing>
 </p:sld>
 </file>
 
@@ -18065,7 +18226,7 @@
           <a:p>
             <a:r>
               <a:rPr lang="fr-FR" dirty="0" smtClean="0"/>
-              <a:t>Conclusion</a:t>
+              <a:t>L’algorithme génétiques</a:t>
             </a:r>
             <a:endParaRPr lang="en-US" dirty="0"/>
           </a:p>
@@ -18083,21 +18244,34 @@
         </p:nvSpPr>
         <p:spPr/>
         <p:txBody>
-          <a:bodyPr/>
+          <a:bodyPr>
+            <a:normAutofit/>
+          </a:bodyPr>
           <a:lstStyle/>
           <a:p>
             <a:r>
               <a:rPr lang="fr-FR" dirty="0" smtClean="0"/>
-              <a:t>Il nous faut plus de processeur.</a:t>
+              <a:t>20 Environnement qui tournent en parallèles pendant 30min.</a:t>
             </a:r>
-          </a:p>
-          <a:p>
-            <a:endParaRPr lang="fr-FR" dirty="0" smtClean="0"/>
+            <a:endParaRPr lang="fr-FR" dirty="0"/>
           </a:p>
           <a:p>
             <a:r>
               <a:rPr lang="fr-FR" dirty="0" smtClean="0"/>
-              <a:t>Il nous faut plus de temps de calcul.</a:t>
+              <a:t>On évalue chaque environnement, on choisie les parents proportionnellement a leurs performance.</a:t>
+            </a:r>
+          </a:p>
+          <a:p>
+            <a:r>
+              <a:rPr lang="fr-FR" dirty="0" smtClean="0"/>
+              <a:t>On choisie le maillon faible en inversant la perf.</a:t>
+            </a:r>
+            <a:endParaRPr lang="fr-FR" dirty="0"/>
+          </a:p>
+          <a:p>
+            <a:r>
+              <a:rPr lang="fr-FR" dirty="0" smtClean="0"/>
+              <a:t>1 chance sur 10 d’avoir une mutation.</a:t>
             </a:r>
           </a:p>
           <a:p>
@@ -18134,25 +18308,18 @@
     </p:spTree>
     <p:extLst>
       <p:ext uri="{BB962C8B-B14F-4D97-AF65-F5344CB8AC3E}">
-        <p14:creationId xmlns:p14="http://schemas.microsoft.com/office/powerpoint/2010/main" val="2290641020"/>
+        <p14:creationId xmlns:p14="http://schemas.microsoft.com/office/powerpoint/2010/main" val="3949835561"/>
       </p:ext>
     </p:extLst>
   </p:cSld>
   <p:clrMapOvr>
     <a:masterClrMapping/>
   </p:clrMapOvr>
-  <p:timing>
-    <p:tnLst>
-      <p:par>
-        <p:cTn id="1" dur="indefinite" restart="never" nodeType="tmRoot"/>
-      </p:par>
-    </p:tnLst>
-  </p:timing>
 </p:sld>
 </file>
 
 <file path=ppt/slides/slide9.xml><?xml version="1.0" encoding="utf-8"?>
-<p:sld xmlns:a="http://schemas.openxmlformats.org/drawingml/2006/main" xmlns:r="http://schemas.openxmlformats.org/officeDocument/2006/relationships" xmlns:p="http://schemas.openxmlformats.org/presentationml/2006/main" show="0">
+<p:sld xmlns:a="http://schemas.openxmlformats.org/drawingml/2006/main" xmlns:r="http://schemas.openxmlformats.org/officeDocument/2006/relationships" xmlns:p="http://schemas.openxmlformats.org/presentationml/2006/main">
   <p:cSld>
     <p:spTree>
       <p:nvGrpSpPr>
@@ -18185,7 +18352,7 @@
           <a:p>
             <a:r>
               <a:rPr lang="fr-FR" dirty="0" smtClean="0"/>
-              <a:t>Environnement des l'IA</a:t>
+              <a:t>Conclusion</a:t>
             </a:r>
             <a:endParaRPr lang="en-US" dirty="0"/>
           </a:p>
@@ -18208,37 +18375,29 @@
           <a:p>
             <a:r>
               <a:rPr lang="fr-FR" dirty="0" smtClean="0"/>
-              <a:t>Partiellement Observable</a:t>
+              <a:t>Il nous faut plus de processeur.</a:t>
             </a:r>
-            <a:endParaRPr lang="fr-FR" dirty="0"/>
+          </a:p>
+          <a:p>
+            <a:endParaRPr lang="fr-FR" dirty="0" smtClean="0"/>
           </a:p>
           <a:p>
             <a:r>
               <a:rPr lang="fr-FR" dirty="0" smtClean="0"/>
-              <a:t>Continue (la simulation évolue).</a:t>
+              <a:t>Il nous faut plus de temps de calcul.</a:t>
             </a:r>
+          </a:p>
+          <a:p>
             <a:endParaRPr lang="fr-FR" dirty="0"/>
           </a:p>
           <a:p>
             <a:r>
               <a:rPr lang="fr-FR" dirty="0" smtClean="0"/>
-              <a:t>Déterministe (par de jeux de hasard).</a:t>
+              <a:t>Essayer d’optimisé le réseau de neurone pour l’utilisation.</a:t>
             </a:r>
           </a:p>
           <a:p>
-            <a:r>
-              <a:rPr lang="fr-FR" dirty="0" smtClean="0"/>
-              <a:t>Discrète.</a:t>
-            </a:r>
-          </a:p>
-          <a:p>
-            <a:r>
-              <a:rPr lang="fr-FR" dirty="0" smtClean="0"/>
-              <a:t>Compétitif</a:t>
-            </a:r>
-          </a:p>
-          <a:p>
-            <a:endParaRPr lang="fr-FR" dirty="0"/>
+            <a:endParaRPr lang="fr-FR" dirty="0" smtClean="0"/>
           </a:p>
           <a:p>
             <a:endParaRPr lang="en-US" dirty="0"/>
@@ -18271,21 +18430,20 @@
     </p:spTree>
     <p:extLst>
       <p:ext uri="{BB962C8B-B14F-4D97-AF65-F5344CB8AC3E}">
-        <p14:creationId xmlns:p14="http://schemas.microsoft.com/office/powerpoint/2010/main" val="1363514379"/>
+        <p14:creationId xmlns:p14="http://schemas.microsoft.com/office/powerpoint/2010/main" val="2290641020"/>
       </p:ext>
     </p:extLst>
   </p:cSld>
   <p:clrMapOvr>
     <a:masterClrMapping/>
   </p:clrMapOvr>
-  <mc:AlternateContent xmlns:mc="http://schemas.openxmlformats.org/markup-compatibility/2006" xmlns:p14="http://schemas.microsoft.com/office/powerpoint/2010/main">
-    <mc:Choice Requires="p14">
-      <p:transition spd="slow" p14:dur="2000"/>
-    </mc:Choice>
-    <mc:Fallback xmlns="">
-      <p:transition spd="slow"/>
-    </mc:Fallback>
-  </mc:AlternateContent>
+  <p:timing>
+    <p:tnLst>
+      <p:par>
+        <p:cTn id="1" dur="indefinite" restart="never" nodeType="tmRoot"/>
+      </p:par>
+    </p:tnLst>
+  </p:timing>
 </p:sld>
 </file>
 

</xml_diff>